<commit_message>
postertemplate and minor ppt change
</commit_message>
<xml_diff>
--- a/doc/Cer2016_Femke Thon & Jolien Gay_V3.0.pptx
+++ b/doc/Cer2016_Femke Thon & Jolien Gay_V3.0.pptx
@@ -1020,8 +1020,37 @@
           <a:lstStyle/>
           <a:p>
             <a:r>
-              <a:rPr lang="en-GB" dirty="0" smtClean="0"/>
-              <a:t>Hey, some of those gamma statistics are quite different between the species trees and the posterior! Let's take a look at that.</a:t>
+              <a:rPr lang="en-GB" sz="1200" b="0" i="0" kern="1200" dirty="0" smtClean="0">
+                <a:solidFill>
+                  <a:schemeClr val="tx1"/>
+                </a:solidFill>
+                <a:latin typeface="+mn-lt"/>
+                <a:ea typeface="+mn-ea"/>
+                <a:cs typeface="+mn-cs"/>
+              </a:rPr>
+              <a:t>It seems like there is one parameter which is unusually often present in corrupt files: a species initiation rate of 0.4. For some reason, these are very often corrupted. This is very unexpected, as we’d expect something going wrong with the program if the computer would be overwhelmed by calculations - for example if the speciation </a:t>
+            </a:r>
+            <a:r>
+              <a:rPr lang="en-GB" sz="1200" b="0" i="0" kern="1200" dirty="0" err="1" smtClean="0">
+                <a:solidFill>
+                  <a:schemeClr val="tx1"/>
+                </a:solidFill>
+                <a:latin typeface="+mn-lt"/>
+                <a:ea typeface="+mn-ea"/>
+                <a:cs typeface="+mn-cs"/>
+              </a:rPr>
+              <a:t>initiatoin</a:t>
+            </a:r>
+            <a:r>
+              <a:rPr lang="en-GB" sz="1200" b="0" i="0" kern="1200" dirty="0" smtClean="0">
+                <a:solidFill>
+                  <a:schemeClr val="tx1"/>
+                </a:solidFill>
+                <a:latin typeface="+mn-lt"/>
+                <a:ea typeface="+mn-ea"/>
+                <a:cs typeface="+mn-cs"/>
+              </a:rPr>
+              <a:t> rate is high. But high speciation rates seem to be fine:</a:t>
             </a:r>
             <a:endParaRPr lang="en-GB" dirty="0"/>
           </a:p>
@@ -4649,18 +4678,7 @@
                   </a:schemeClr>
                 </a:solidFill>
               </a:rPr>
-              <a:t>Supervisors</a:t>
-            </a:r>
-            <a:r>
-              <a:rPr lang="en-GB" sz="2000" dirty="0" smtClean="0">
-                <a:solidFill>
-                  <a:schemeClr val="tx1">
-                    <a:lumMod val="85000"/>
-                    <a:lumOff val="15000"/>
-                  </a:schemeClr>
-                </a:solidFill>
-              </a:rPr>
-              <a:t>: </a:t>
+              <a:t>Supervisors: </a:t>
             </a:r>
             <a:r>
               <a:rPr lang="en-GB" sz="2000" dirty="0" err="1" smtClean="0">
@@ -4849,17 +4867,95 @@
         </p:nvSpPr>
         <p:spPr/>
         <p:txBody>
-          <a:bodyPr/>
+          <a:bodyPr>
+            <a:normAutofit fontScale="90000"/>
+          </a:bodyPr>
           <a:lstStyle/>
           <a:p>
             <a:r>
               <a:rPr lang="en-GB" b="1" dirty="0" smtClean="0"/>
-              <a:t>Results:</a:t>
-            </a:r>
-            <a:endParaRPr lang="en-GB" b="1" dirty="0"/>
-          </a:p>
-        </p:txBody>
-      </p:sp>
+              <a:t>Results</a:t>
+            </a:r>
+            <a:r>
+              <a:rPr lang="en-GB" b="1" dirty="0" smtClean="0"/>
+              <a:t>: </a:t>
+            </a:r>
+            <a:r>
+              <a:rPr lang="en-GB" dirty="0" smtClean="0"/>
+              <a:t>Speciation </a:t>
+            </a:r>
+            <a:r>
+              <a:rPr lang="en-GB" dirty="0" smtClean="0"/>
+              <a:t>Initiation Rate (SIR)</a:t>
+            </a:r>
+            <a:endParaRPr lang="en-GB" dirty="0"/>
+          </a:p>
+        </p:txBody>
+      </p:sp>
+      <p:pic>
+        <p:nvPicPr>
+          <p:cNvPr id="1026" name="Picture 2"/>
+          <p:cNvPicPr>
+            <a:picLocks noChangeAspect="1" noChangeArrowheads="1"/>
+          </p:cNvPicPr>
+          <p:nvPr/>
+        </p:nvPicPr>
+        <p:blipFill>
+          <a:blip r:embed="rId4" cstate="print"/>
+          <a:srcRect/>
+          <a:stretch>
+            <a:fillRect/>
+          </a:stretch>
+        </p:blipFill>
+        <p:spPr bwMode="auto">
+          <a:xfrm>
+            <a:off x="304800" y="1905000"/>
+            <a:ext cx="3810000" cy="3810000"/>
+          </a:xfrm>
+          <a:prstGeom prst="rect">
+            <a:avLst/>
+          </a:prstGeom>
+          <a:noFill/>
+          <a:ln w="9525">
+            <a:noFill/>
+            <a:miter lim="800000"/>
+            <a:headEnd/>
+            <a:tailEnd/>
+          </a:ln>
+        </p:spPr>
+      </p:pic>
+      <p:pic>
+        <p:nvPicPr>
+          <p:cNvPr id="1027" name="Picture 3"/>
+          <p:cNvPicPr>
+            <a:picLocks noChangeAspect="1" noChangeArrowheads="1"/>
+          </p:cNvPicPr>
+          <p:nvPr/>
+        </p:nvPicPr>
+        <p:blipFill>
+          <a:blip r:embed="rId5" cstate="print"/>
+          <a:srcRect/>
+          <a:stretch>
+            <a:fillRect/>
+          </a:stretch>
+        </p:blipFill>
+        <p:spPr bwMode="auto">
+          <a:xfrm>
+            <a:off x="4800600" y="1905000"/>
+            <a:ext cx="3810000" cy="3810000"/>
+          </a:xfrm>
+          <a:prstGeom prst="rect">
+            <a:avLst/>
+          </a:prstGeom>
+          <a:noFill/>
+          <a:ln w="9525">
+            <a:noFill/>
+            <a:miter lim="800000"/>
+            <a:headEnd/>
+            <a:tailEnd/>
+          </a:ln>
+        </p:spPr>
+      </p:pic>
     </p:spTree>
   </p:cSld>
   <p:clrMapOvr>
@@ -7979,11 +8075,7 @@
             </a:pPr>
             <a:r>
               <a:rPr lang="en-GB" dirty="0" smtClean="0"/>
-              <a:t>If </a:t>
-            </a:r>
-            <a:r>
-              <a:rPr lang="en-GB" dirty="0" smtClean="0"/>
-              <a:t>speciation in nature takes </a:t>
+              <a:t>If speciation in nature takes </a:t>
             </a:r>
             <a:r>
               <a:rPr lang="en-GB" b="1" dirty="0" smtClean="0"/>
@@ -7993,7 +8085,6 @@
               <a:rPr lang="en-GB" dirty="0" smtClean="0"/>
               <a:t>, </a:t>
             </a:r>
-            <a:endParaRPr lang="en-GB" dirty="0" smtClean="0"/>
           </a:p>
           <a:p>
             <a:pPr algn="ctr">
@@ -8001,11 +8092,7 @@
             </a:pPr>
             <a:r>
               <a:rPr lang="en-GB" dirty="0" smtClean="0"/>
-              <a:t>what </a:t>
-            </a:r>
-            <a:r>
-              <a:rPr lang="en-GB" dirty="0" smtClean="0"/>
-              <a:t>is the </a:t>
+              <a:t>what is the </a:t>
             </a:r>
             <a:r>
               <a:rPr lang="en-GB" b="1" dirty="0" smtClean="0"/>
@@ -8013,11 +8100,7 @@
             </a:r>
             <a:r>
               <a:rPr lang="en-GB" dirty="0" smtClean="0"/>
-              <a:t> BEAST2 makes in inferring a phylogeny</a:t>
-            </a:r>
-            <a:r>
-              <a:rPr lang="en-GB" dirty="0" smtClean="0"/>
-              <a:t>?</a:t>
+              <a:t> BEAST2 makes in inferring a phylogeny?</a:t>
             </a:r>
             <a:endParaRPr lang="nl-NL" dirty="0" smtClean="0"/>
           </a:p>
@@ -9561,11 +9644,15 @@
             <a:avLst/>
           </a:prstGeom>
           <a:solidFill>
-            <a:srgbClr val="FFC000"/>
+            <a:schemeClr val="accent6">
+              <a:lumMod val="75000"/>
+            </a:schemeClr>
           </a:solidFill>
           <a:ln>
             <a:solidFill>
-              <a:srgbClr val="5E5E5E"/>
+              <a:schemeClr val="accent6">
+                <a:lumMod val="75000"/>
+              </a:schemeClr>
             </a:solidFill>
           </a:ln>
         </p:spPr>
@@ -9604,7 +9691,7 @@
         </p:nvSpPr>
         <p:spPr>
           <a:xfrm>
-            <a:off x="609600" y="427038"/>
+            <a:off x="533400" y="228600"/>
             <a:ext cx="8229600" cy="1143000"/>
           </a:xfrm>
           <a:prstGeom prst="rect">
@@ -9802,8 +9889,8 @@
         </p:blipFill>
         <p:spPr bwMode="auto">
           <a:xfrm>
-            <a:off x="5715000" y="4419600"/>
-            <a:ext cx="2746375" cy="1744663"/>
+            <a:off x="5715001" y="4518431"/>
+            <a:ext cx="2590800" cy="1645832"/>
           </a:xfrm>
           <a:prstGeom prst="rect">
             <a:avLst/>
@@ -9862,11 +9949,7 @@
             <a:pPr algn="ctr"/>
             <a:r>
               <a:rPr lang="en-GB" dirty="0" smtClean="0"/>
-              <a:t>s</a:t>
-            </a:r>
-            <a:r>
-              <a:rPr lang="en-GB" dirty="0" smtClean="0"/>
-              <a:t>pecies tree</a:t>
+              <a:t>species tree</a:t>
             </a:r>
             <a:endParaRPr lang="en-GB" dirty="0"/>
           </a:p>
@@ -9918,11 +10001,15 @@
             <a:avLst/>
           </a:prstGeom>
           <a:solidFill>
-            <a:srgbClr val="FFC000"/>
+            <a:schemeClr val="accent6">
+              <a:lumMod val="75000"/>
+            </a:schemeClr>
           </a:solidFill>
           <a:ln>
             <a:solidFill>
-              <a:srgbClr val="5E5E5E"/>
+              <a:schemeClr val="accent6">
+                <a:lumMod val="75000"/>
+              </a:schemeClr>
             </a:solidFill>
           </a:ln>
         </p:spPr>
@@ -9966,11 +10053,15 @@
             <a:avLst/>
           </a:prstGeom>
           <a:solidFill>
-            <a:srgbClr val="FFC000"/>
+            <a:schemeClr val="accent6">
+              <a:lumMod val="75000"/>
+            </a:schemeClr>
           </a:solidFill>
           <a:ln>
             <a:solidFill>
-              <a:srgbClr val="5E5E5E"/>
+              <a:schemeClr val="accent6">
+                <a:lumMod val="75000"/>
+              </a:schemeClr>
             </a:solidFill>
           </a:ln>
         </p:spPr>
@@ -10702,46 +10793,6 @@
           <a:noFill/>
         </p:spPr>
       </p:pic>
-      <p:sp>
-        <p:nvSpPr>
-          <p:cNvPr id="2" name="Title 1"/>
-          <p:cNvSpPr>
-            <a:spLocks noGrp="1"/>
-          </p:cNvSpPr>
-          <p:nvPr>
-            <p:ph type="title"/>
-          </p:nvPr>
-        </p:nvSpPr>
-        <p:spPr/>
-        <p:txBody>
-          <a:bodyPr>
-            <a:normAutofit fontScale="90000"/>
-          </a:bodyPr>
-          <a:lstStyle/>
-          <a:p>
-            <a:r>
-              <a:rPr lang="en-GB" b="1" dirty="0" smtClean="0"/>
-              <a:t>Results: </a:t>
-            </a:r>
-            <a:r>
-              <a:rPr lang="en-GB" sz="3100" dirty="0" smtClean="0"/>
-              <a:t>Distribution </a:t>
-            </a:r>
-            <a:r>
-              <a:rPr lang="en-GB" sz="3100" dirty="0" smtClean="0"/>
-              <a:t>gamma statistics</a:t>
-            </a:r>
-            <a:r>
-              <a:rPr lang="en-GB" dirty="0" smtClean="0"/>
-              <a:t/>
-            </a:r>
-            <a:br>
-              <a:rPr lang="en-GB" dirty="0" smtClean="0"/>
-            </a:br>
-            <a:endParaRPr lang="en-GB" b="1" dirty="0"/>
-          </a:p>
-        </p:txBody>
-      </p:sp>
       <p:pic>
         <p:nvPicPr>
           <p:cNvPr id="5122" name="Picture 2"/>
@@ -10759,8 +10810,8 @@
         </p:blipFill>
         <p:spPr bwMode="auto">
           <a:xfrm>
-            <a:off x="762000" y="838200"/>
-            <a:ext cx="5257800" cy="2918320"/>
+            <a:off x="2057400" y="1143000"/>
+            <a:ext cx="5105400" cy="2833732"/>
           </a:xfrm>
           <a:prstGeom prst="rect">
             <a:avLst/>
@@ -10774,6 +10825,39 @@
           </a:ln>
         </p:spPr>
       </p:pic>
+      <p:sp>
+        <p:nvSpPr>
+          <p:cNvPr id="2" name="Title 1"/>
+          <p:cNvSpPr>
+            <a:spLocks noGrp="1"/>
+          </p:cNvSpPr>
+          <p:nvPr>
+            <p:ph type="title"/>
+          </p:nvPr>
+        </p:nvSpPr>
+        <p:spPr/>
+        <p:txBody>
+          <a:bodyPr>
+            <a:normAutofit/>
+          </a:bodyPr>
+          <a:lstStyle/>
+          <a:p>
+            <a:r>
+              <a:rPr lang="en-GB" sz="4900" b="1" dirty="0" smtClean="0"/>
+              <a:t>Results: </a:t>
+            </a:r>
+            <a:r>
+              <a:rPr lang="en-GB" sz="3600" dirty="0" smtClean="0"/>
+              <a:t>Distribution gamma </a:t>
+            </a:r>
+            <a:r>
+              <a:rPr lang="en-GB" sz="3600" dirty="0" smtClean="0"/>
+              <a:t>statistics</a:t>
+            </a:r>
+            <a:endParaRPr lang="en-GB" b="1" dirty="0"/>
+          </a:p>
+        </p:txBody>
+      </p:sp>
       <p:pic>
         <p:nvPicPr>
           <p:cNvPr id="5123" name="Picture 3"/>
@@ -10791,7 +10875,7 @@
         </p:blipFill>
         <p:spPr bwMode="auto">
           <a:xfrm>
-            <a:off x="3048000" y="3581400"/>
+            <a:off x="1905000" y="3939680"/>
             <a:ext cx="5257800" cy="2918320"/>
           </a:xfrm>
           <a:prstGeom prst="rect">

</xml_diff>

<commit_message>
Do not commit big .csv
</commit_message>
<xml_diff>
--- a/doc/Cer2016_Femke Thon & Jolien Gay_V3.0.pptx
+++ b/doc/Cer2016_Femke Thon & Jolien Gay_V3.0.pptx
@@ -5,7 +5,7 @@
     <p:sldMasterId id="2147483648" r:id="rId1"/>
   </p:sldMasterIdLst>
   <p:notesMasterIdLst>
-    <p:notesMasterId r:id="rId21"/>
+    <p:notesMasterId r:id="rId25"/>
   </p:notesMasterIdLst>
   <p:sldIdLst>
     <p:sldId id="256" r:id="rId2"/>
@@ -16,17 +16,21 @@
     <p:sldId id="266" r:id="rId7"/>
     <p:sldId id="277" r:id="rId8"/>
     <p:sldId id="273" r:id="rId9"/>
-    <p:sldId id="259" r:id="rId10"/>
-    <p:sldId id="274" r:id="rId11"/>
-    <p:sldId id="260" r:id="rId12"/>
-    <p:sldId id="261" r:id="rId13"/>
-    <p:sldId id="265" r:id="rId14"/>
-    <p:sldId id="275" r:id="rId15"/>
-    <p:sldId id="278" r:id="rId16"/>
-    <p:sldId id="279" r:id="rId17"/>
-    <p:sldId id="280" r:id="rId18"/>
-    <p:sldId id="281" r:id="rId19"/>
-    <p:sldId id="282" r:id="rId20"/>
+    <p:sldId id="283" r:id="rId10"/>
+    <p:sldId id="286" r:id="rId11"/>
+    <p:sldId id="288" r:id="rId12"/>
+    <p:sldId id="287" r:id="rId13"/>
+    <p:sldId id="274" r:id="rId14"/>
+    <p:sldId id="284" r:id="rId15"/>
+    <p:sldId id="285" r:id="rId16"/>
+    <p:sldId id="260" r:id="rId17"/>
+    <p:sldId id="261" r:id="rId18"/>
+    <p:sldId id="265" r:id="rId19"/>
+    <p:sldId id="278" r:id="rId20"/>
+    <p:sldId id="279" r:id="rId21"/>
+    <p:sldId id="280" r:id="rId22"/>
+    <p:sldId id="281" r:id="rId23"/>
+    <p:sldId id="282" r:id="rId24"/>
   </p:sldIdLst>
   <p:sldSz cx="9144000" cy="6858000" type="screen4x3"/>
   <p:notesSz cx="6858000" cy="9144000"/>
@@ -211,7 +215,7 @@
             <a:fld id="{31638245-5222-4875-B595-DAA9E1B2F047}" type="datetimeFigureOut">
               <a:rPr lang="en-GB" smtClean="0"/>
               <a:pPr/>
-              <a:t>25/05/2016</a:t>
+              <a:t>26/05/2016</a:t>
             </a:fld>
             <a:endParaRPr lang="en-GB"/>
           </a:p>
@@ -605,6 +609,20 @@
           </a:bodyPr>
           <a:lstStyle/>
           <a:p>
+            <a:r>
+              <a:rPr lang="nl-NL" dirty="0" smtClean="0"/>
+              <a:t>Outgroup may be unnecessary.</a:t>
+            </a:r>
+            <a:r>
+              <a:rPr lang="nl-NL" baseline="0" dirty="0" smtClean="0"/>
+              <a:t> Constant clock rate used.</a:t>
+            </a:r>
+            <a:endParaRPr lang="nl-NL" dirty="0" smtClean="0"/>
+          </a:p>
+          <a:p>
+            <a:endParaRPr lang="nl-NL" dirty="0" smtClean="0"/>
+          </a:p>
+          <a:p>
             <a:endParaRPr lang="en-GB" dirty="0"/>
           </a:p>
         </p:txBody>
@@ -627,7 +645,7 @@
             <a:fld id="{9BBE7A90-5B18-44E6-896F-B56F6E25EE11}" type="slidenum">
               <a:rPr lang="en-GB" smtClean="0"/>
               <a:pPr/>
-              <a:t>17</a:t>
+              <a:t>20</a:t>
             </a:fld>
             <a:endParaRPr lang="en-GB"/>
           </a:p>
@@ -709,7 +727,7 @@
             <a:fld id="{9BBE7A90-5B18-44E6-896F-B56F6E25EE11}" type="slidenum">
               <a:rPr lang="en-GB" smtClean="0"/>
               <a:pPr/>
-              <a:t>18</a:t>
+              <a:t>21</a:t>
             </a:fld>
             <a:endParaRPr lang="en-GB"/>
           </a:p>
@@ -791,7 +809,89 @@
             <a:fld id="{9BBE7A90-5B18-44E6-896F-B56F6E25EE11}" type="slidenum">
               <a:rPr lang="en-GB" smtClean="0"/>
               <a:pPr/>
-              <a:t>19</a:t>
+              <a:t>22</a:t>
+            </a:fld>
+            <a:endParaRPr lang="en-GB"/>
+          </a:p>
+        </p:txBody>
+      </p:sp>
+    </p:spTree>
+  </p:cSld>
+  <p:clrMapOvr>
+    <a:masterClrMapping/>
+  </p:clrMapOvr>
+</p:notes>
+</file>
+
+<file path=ppt/notesSlides/notesSlide13.xml><?xml version="1.0" encoding="utf-8"?>
+<p:notes xmlns:a="http://schemas.openxmlformats.org/drawingml/2006/main" xmlns:r="http://schemas.openxmlformats.org/officeDocument/2006/relationships" xmlns:p="http://schemas.openxmlformats.org/presentationml/2006/main">
+  <p:cSld>
+    <p:spTree>
+      <p:nvGrpSpPr>
+        <p:cNvPr id="1" name=""/>
+        <p:cNvGrpSpPr/>
+        <p:nvPr/>
+      </p:nvGrpSpPr>
+      <p:grpSpPr>
+        <a:xfrm>
+          <a:off x="0" y="0"/>
+          <a:ext cx="0" cy="0"/>
+          <a:chOff x="0" y="0"/>
+          <a:chExt cx="0" cy="0"/>
+        </a:xfrm>
+      </p:grpSpPr>
+      <p:sp>
+        <p:nvSpPr>
+          <p:cNvPr id="2" name="Slide Image Placeholder 1"/>
+          <p:cNvSpPr>
+            <a:spLocks noGrp="1" noRot="1" noChangeAspect="1"/>
+          </p:cNvSpPr>
+          <p:nvPr>
+            <p:ph type="sldImg"/>
+          </p:nvPr>
+        </p:nvSpPr>
+        <p:spPr/>
+      </p:sp>
+      <p:sp>
+        <p:nvSpPr>
+          <p:cNvPr id="3" name="Notes Placeholder 2"/>
+          <p:cNvSpPr>
+            <a:spLocks noGrp="1"/>
+          </p:cNvSpPr>
+          <p:nvPr>
+            <p:ph type="body" idx="1"/>
+          </p:nvPr>
+        </p:nvSpPr>
+        <p:spPr/>
+        <p:txBody>
+          <a:bodyPr>
+            <a:normAutofit/>
+          </a:bodyPr>
+          <a:lstStyle/>
+          <a:p>
+            <a:endParaRPr lang="en-GB" dirty="0"/>
+          </a:p>
+        </p:txBody>
+      </p:sp>
+      <p:sp>
+        <p:nvSpPr>
+          <p:cNvPr id="4" name="Slide Number Placeholder 3"/>
+          <p:cNvSpPr>
+            <a:spLocks noGrp="1"/>
+          </p:cNvSpPr>
+          <p:nvPr>
+            <p:ph type="sldNum" sz="quarter" idx="10"/>
+          </p:nvPr>
+        </p:nvSpPr>
+        <p:spPr/>
+        <p:txBody>
+          <a:bodyPr/>
+          <a:lstStyle/>
+          <a:p>
+            <a:fld id="{9BBE7A90-5B18-44E6-896F-B56F6E25EE11}" type="slidenum">
+              <a:rPr lang="en-GB" smtClean="0"/>
+              <a:pPr/>
+              <a:t>23</a:t>
             </a:fld>
             <a:endParaRPr lang="en-GB"/>
           </a:p>
@@ -1020,37 +1120,80 @@
           <a:lstStyle/>
           <a:p>
             <a:r>
-              <a:rPr lang="en-GB" sz="1200" b="0" i="0" kern="1200" dirty="0" smtClean="0">
-                <a:solidFill>
-                  <a:schemeClr val="tx1"/>
-                </a:solidFill>
-                <a:latin typeface="+mn-lt"/>
-                <a:ea typeface="+mn-ea"/>
-                <a:cs typeface="+mn-cs"/>
-              </a:rPr>
-              <a:t>It seems like there is one parameter which is unusually often present in corrupt files: a species initiation rate of 0.4. For some reason, these are very often corrupted. This is very unexpected, as we’d expect something going wrong with the program if the computer would be overwhelmed by calculations - for example if the speciation </a:t>
-            </a:r>
-            <a:r>
-              <a:rPr lang="en-GB" sz="1200" b="0" i="0" kern="1200" dirty="0" err="1" smtClean="0">
-                <a:solidFill>
-                  <a:schemeClr val="tx1"/>
-                </a:solidFill>
-                <a:latin typeface="+mn-lt"/>
-                <a:ea typeface="+mn-ea"/>
-                <a:cs typeface="+mn-cs"/>
-              </a:rPr>
-              <a:t>initiatoin</a:t>
-            </a:r>
-            <a:r>
-              <a:rPr lang="en-GB" sz="1200" b="0" i="0" kern="1200" dirty="0" smtClean="0">
-                <a:solidFill>
-                  <a:schemeClr val="tx1"/>
-                </a:solidFill>
-                <a:latin typeface="+mn-lt"/>
-                <a:ea typeface="+mn-ea"/>
-                <a:cs typeface="+mn-cs"/>
-              </a:rPr>
-              <a:t> rate is high. But high speciation rates seem to be fine:</a:t>
+              <a:rPr lang="en-GB" dirty="0" smtClean="0"/>
+              <a:t>Two</a:t>
+            </a:r>
+            <a:r>
+              <a:rPr lang="en-GB" baseline="0" dirty="0" smtClean="0"/>
+              <a:t> possible explanations have been proposed to try and explain the observed slowdown</a:t>
+            </a:r>
+          </a:p>
+          <a:p>
+            <a:pPr>
+              <a:buFontTx/>
+              <a:buChar char="-"/>
+            </a:pPr>
+            <a:r>
+              <a:rPr lang="en-GB" b="1" baseline="0" dirty="0" smtClean="0"/>
+              <a:t>Sampling </a:t>
+            </a:r>
+            <a:r>
+              <a:rPr lang="en-GB" b="1" baseline="0" dirty="0" err="1" smtClean="0"/>
+              <a:t>artifact</a:t>
+            </a:r>
+            <a:r>
+              <a:rPr lang="en-GB" baseline="0" dirty="0" smtClean="0"/>
+              <a:t>: 2 artefacts have been found (if a small sample from the actual phylogeny is taken, </a:t>
+            </a:r>
+          </a:p>
+          <a:p>
+            <a:pPr lvl="1">
+              <a:buFontTx/>
+              <a:buNone/>
+            </a:pPr>
+            <a:r>
+              <a:rPr lang="en-GB" i="1" baseline="0" dirty="0" smtClean="0"/>
+              <a:t>BUT</a:t>
+            </a:r>
+            <a:r>
+              <a:rPr lang="en-GB" baseline="0" dirty="0" smtClean="0"/>
+              <a:t>: in nearly complete phylogenies, sampling artefact does not explain the observed slowdown</a:t>
+            </a:r>
+          </a:p>
+          <a:p>
+            <a:pPr>
+              <a:buFontTx/>
+              <a:buChar char="-"/>
+            </a:pPr>
+            <a:r>
+              <a:rPr lang="en-GB" baseline="0" dirty="0" smtClean="0"/>
+              <a:t> </a:t>
+            </a:r>
+            <a:r>
+              <a:rPr lang="en-GB" b="1" baseline="0" dirty="0" smtClean="0"/>
+              <a:t>Species-level density dependence</a:t>
+            </a:r>
+            <a:r>
+              <a:rPr lang="en-GB" baseline="0" dirty="0" smtClean="0"/>
+              <a:t>: no constants speciation or extinction rates like in the pure BD model. Because of niche filling they will decrease with time. </a:t>
+            </a:r>
+          </a:p>
+          <a:p>
+            <a:pPr lvl="1">
+              <a:buFontTx/>
+              <a:buNone/>
+            </a:pPr>
+            <a:r>
+              <a:rPr lang="en-GB" i="1" baseline="0" dirty="0" smtClean="0"/>
+              <a:t>BUT</a:t>
+            </a:r>
+            <a:r>
+              <a:rPr lang="en-GB" baseline="0" dirty="0" smtClean="0"/>
+              <a:t>: new species may create </a:t>
+            </a:r>
+            <a:r>
+              <a:rPr lang="en-GB" baseline="0" smtClean="0"/>
+              <a:t>new niches</a:t>
             </a:r>
             <a:endParaRPr lang="en-GB" dirty="0"/>
           </a:p>
@@ -1074,7 +1217,7 @@
             <a:fld id="{9BBE7A90-5B18-44E6-896F-B56F6E25EE11}" type="slidenum">
               <a:rPr lang="en-GB" smtClean="0"/>
               <a:pPr/>
-              <a:t>10</a:t>
+              <a:t>5</a:t>
             </a:fld>
             <a:endParaRPr lang="en-GB"/>
           </a:p>
@@ -1135,28 +1278,23 @@
           <a:lstStyle/>
           <a:p>
             <a:r>
-              <a:rPr lang="nl-NL" dirty="0" smtClean="0"/>
-              <a:t>POSSIBLE QUESTIONS?:</a:t>
-            </a:r>
-          </a:p>
-          <a:p>
-            <a:r>
-              <a:rPr lang="nl-NL" dirty="0" smtClean="0"/>
-              <a:t>Q1:</a:t>
-            </a:r>
-            <a:r>
-              <a:rPr lang="nl-NL" baseline="0" dirty="0" smtClean="0"/>
-              <a:t> Why did you use an outgroup?</a:t>
-            </a:r>
-          </a:p>
-          <a:p>
-            <a:r>
-              <a:rPr lang="nl-NL" baseline="0" dirty="0" smtClean="0"/>
-              <a:t>Q2: Are the used summary statistics the best, and why?</a:t>
-            </a:r>
-          </a:p>
-          <a:p>
-            <a:endParaRPr lang="en-GB" dirty="0"/>
+              <a:rPr lang="en-GB" dirty="0" smtClean="0"/>
+              <a:t>Graph 1: The lower the 'comparison' value, the bigger the error of BEAST towards higher gamma statistics.</a:t>
+            </a:r>
+          </a:p>
+          <a:p>
+            <a:r>
+              <a:rPr lang="en-GB" dirty="0" smtClean="0"/>
+              <a:t>Interestingly, some parameter values don't show up in the lower comparison values. The higher values for the speciation initiation rate for example (0.8 and 1). This turned to be because of missing posterior gammas for those</a:t>
+            </a:r>
+            <a:r>
+              <a:rPr lang="en-GB" baseline="0" dirty="0" smtClean="0"/>
+              <a:t> </a:t>
+            </a:r>
+            <a:r>
+              <a:rPr lang="en-GB" dirty="0" smtClean="0"/>
+              <a:t>parameters. All files after ```article_1_5_5_2_2.RDA``` appear to be corrupted.</a:t>
+            </a:r>
           </a:p>
         </p:txBody>
       </p:sp>
@@ -1178,7 +1316,7 @@
             <a:fld id="{9BBE7A90-5B18-44E6-896F-B56F6E25EE11}" type="slidenum">
               <a:rPr lang="en-GB" smtClean="0"/>
               <a:pPr/>
-              <a:t>12</a:t>
+              <a:t>10</a:t>
             </a:fld>
             <a:endParaRPr lang="en-GB"/>
           </a:p>
@@ -1238,6 +1376,39 @@
           </a:bodyPr>
           <a:lstStyle/>
           <a:p>
+            <a:r>
+              <a:rPr lang="en-GB" sz="1200" b="0" i="0" kern="1200" dirty="0" smtClean="0">
+                <a:solidFill>
+                  <a:schemeClr val="tx1"/>
+                </a:solidFill>
+                <a:latin typeface="+mn-lt"/>
+                <a:ea typeface="+mn-ea"/>
+                <a:cs typeface="+mn-cs"/>
+              </a:rPr>
+              <a:t>It seems like there is one parameter which is unusually often present in corrupt files: a species initiation rate of 0.4. For some reason, these are very often corrupted. This is very unexpected, as we’d expect something going wrong with the program if the computer would be overwhelmed by calculations - for example if the speciation </a:t>
+            </a:r>
+            <a:r>
+              <a:rPr lang="en-GB" sz="1200" b="0" i="0" kern="1200" dirty="0" err="1" smtClean="0">
+                <a:solidFill>
+                  <a:schemeClr val="tx1"/>
+                </a:solidFill>
+                <a:latin typeface="+mn-lt"/>
+                <a:ea typeface="+mn-ea"/>
+                <a:cs typeface="+mn-cs"/>
+              </a:rPr>
+              <a:t>initiatoin</a:t>
+            </a:r>
+            <a:r>
+              <a:rPr lang="en-GB" sz="1200" b="0" i="0" kern="1200" dirty="0" smtClean="0">
+                <a:solidFill>
+                  <a:schemeClr val="tx1"/>
+                </a:solidFill>
+                <a:latin typeface="+mn-lt"/>
+                <a:ea typeface="+mn-ea"/>
+                <a:cs typeface="+mn-cs"/>
+              </a:rPr>
+              <a:t> rate is high. But high speciation rates seem to be fine:</a:t>
+            </a:r>
             <a:endParaRPr lang="en-GB" dirty="0"/>
           </a:p>
         </p:txBody>
@@ -1320,6 +1491,28 @@
           </a:bodyPr>
           <a:lstStyle/>
           <a:p>
+            <a:r>
+              <a:rPr lang="nl-NL" dirty="0" smtClean="0"/>
+              <a:t>POSSIBLE QUESTIONS?:</a:t>
+            </a:r>
+          </a:p>
+          <a:p>
+            <a:r>
+              <a:rPr lang="nl-NL" dirty="0" smtClean="0"/>
+              <a:t>Q1:</a:t>
+            </a:r>
+            <a:r>
+              <a:rPr lang="nl-NL" baseline="0" dirty="0" smtClean="0"/>
+              <a:t> Why did you use an outgroup?</a:t>
+            </a:r>
+          </a:p>
+          <a:p>
+            <a:r>
+              <a:rPr lang="nl-NL" baseline="0" dirty="0" smtClean="0"/>
+              <a:t>Q2: Are the used summary statistics the best, and why?</a:t>
+            </a:r>
+          </a:p>
+          <a:p>
             <a:endParaRPr lang="en-GB" dirty="0"/>
           </a:p>
         </p:txBody>
@@ -1342,7 +1535,7 @@
             <a:fld id="{9BBE7A90-5B18-44E6-896F-B56F6E25EE11}" type="slidenum">
               <a:rPr lang="en-GB" smtClean="0"/>
               <a:pPr/>
-              <a:t>14</a:t>
+              <a:t>17</a:t>
             </a:fld>
             <a:endParaRPr lang="en-GB"/>
           </a:p>
@@ -1424,7 +1617,7 @@
             <a:fld id="{9BBE7A90-5B18-44E6-896F-B56F6E25EE11}" type="slidenum">
               <a:rPr lang="en-GB" smtClean="0"/>
               <a:pPr/>
-              <a:t>15</a:t>
+              <a:t>18</a:t>
             </a:fld>
             <a:endParaRPr lang="en-GB"/>
           </a:p>
@@ -1484,20 +1677,6 @@
           </a:bodyPr>
           <a:lstStyle/>
           <a:p>
-            <a:r>
-              <a:rPr lang="nl-NL" dirty="0" smtClean="0"/>
-              <a:t>Outgroup may be unnecessary.</a:t>
-            </a:r>
-            <a:r>
-              <a:rPr lang="nl-NL" baseline="0" dirty="0" smtClean="0"/>
-              <a:t> Constant clock rate used.</a:t>
-            </a:r>
-            <a:endParaRPr lang="nl-NL" dirty="0" smtClean="0"/>
-          </a:p>
-          <a:p>
-            <a:endParaRPr lang="nl-NL" dirty="0" smtClean="0"/>
-          </a:p>
-          <a:p>
             <a:endParaRPr lang="en-GB" dirty="0"/>
           </a:p>
         </p:txBody>
@@ -1520,7 +1699,7 @@
             <a:fld id="{9BBE7A90-5B18-44E6-896F-B56F6E25EE11}" type="slidenum">
               <a:rPr lang="en-GB" smtClean="0"/>
               <a:pPr/>
-              <a:t>16</a:t>
+              <a:t>19</a:t>
             </a:fld>
             <a:endParaRPr lang="en-GB"/>
           </a:p>
@@ -1716,7 +1895,7 @@
             <a:fld id="{1D8BD707-D9CF-40AE-B4C6-C98DA3205C09}" type="datetimeFigureOut">
               <a:rPr lang="en-US" smtClean="0"/>
               <a:pPr/>
-              <a:t>5/25/2016</a:t>
+              <a:t>5/26/2016</a:t>
             </a:fld>
             <a:endParaRPr lang="en-US"/>
           </a:p>
@@ -1883,7 +2062,7 @@
             <a:fld id="{1D8BD707-D9CF-40AE-B4C6-C98DA3205C09}" type="datetimeFigureOut">
               <a:rPr lang="en-US" smtClean="0"/>
               <a:pPr/>
-              <a:t>5/25/2016</a:t>
+              <a:t>5/26/2016</a:t>
             </a:fld>
             <a:endParaRPr lang="en-US"/>
           </a:p>
@@ -2060,7 +2239,7 @@
             <a:fld id="{1D8BD707-D9CF-40AE-B4C6-C98DA3205C09}" type="datetimeFigureOut">
               <a:rPr lang="en-US" smtClean="0"/>
               <a:pPr/>
-              <a:t>5/25/2016</a:t>
+              <a:t>5/26/2016</a:t>
             </a:fld>
             <a:endParaRPr lang="en-US"/>
           </a:p>
@@ -2227,7 +2406,7 @@
             <a:fld id="{1D8BD707-D9CF-40AE-B4C6-C98DA3205C09}" type="datetimeFigureOut">
               <a:rPr lang="en-US" smtClean="0"/>
               <a:pPr/>
-              <a:t>5/25/2016</a:t>
+              <a:t>5/26/2016</a:t>
             </a:fld>
             <a:endParaRPr lang="en-US"/>
           </a:p>
@@ -2470,7 +2649,7 @@
             <a:fld id="{1D8BD707-D9CF-40AE-B4C6-C98DA3205C09}" type="datetimeFigureOut">
               <a:rPr lang="en-US" smtClean="0"/>
               <a:pPr/>
-              <a:t>5/25/2016</a:t>
+              <a:t>5/26/2016</a:t>
             </a:fld>
             <a:endParaRPr lang="en-US"/>
           </a:p>
@@ -2755,7 +2934,7 @@
             <a:fld id="{1D8BD707-D9CF-40AE-B4C6-C98DA3205C09}" type="datetimeFigureOut">
               <a:rPr lang="en-US" smtClean="0"/>
               <a:pPr/>
-              <a:t>5/25/2016</a:t>
+              <a:t>5/26/2016</a:t>
             </a:fld>
             <a:endParaRPr lang="en-US"/>
           </a:p>
@@ -3174,7 +3353,7 @@
             <a:fld id="{1D8BD707-D9CF-40AE-B4C6-C98DA3205C09}" type="datetimeFigureOut">
               <a:rPr lang="en-US" smtClean="0"/>
               <a:pPr/>
-              <a:t>5/25/2016</a:t>
+              <a:t>5/26/2016</a:t>
             </a:fld>
             <a:endParaRPr lang="en-US"/>
           </a:p>
@@ -3289,7 +3468,7 @@
             <a:fld id="{1D8BD707-D9CF-40AE-B4C6-C98DA3205C09}" type="datetimeFigureOut">
               <a:rPr lang="en-US" smtClean="0"/>
               <a:pPr/>
-              <a:t>5/25/2016</a:t>
+              <a:t>5/26/2016</a:t>
             </a:fld>
             <a:endParaRPr lang="en-US"/>
           </a:p>
@@ -3381,7 +3560,7 @@
             <a:fld id="{1D8BD707-D9CF-40AE-B4C6-C98DA3205C09}" type="datetimeFigureOut">
               <a:rPr lang="en-US" smtClean="0"/>
               <a:pPr/>
-              <a:t>5/25/2016</a:t>
+              <a:t>5/26/2016</a:t>
             </a:fld>
             <a:endParaRPr lang="en-US"/>
           </a:p>
@@ -3655,7 +3834,7 @@
             <a:fld id="{1D8BD707-D9CF-40AE-B4C6-C98DA3205C09}" type="datetimeFigureOut">
               <a:rPr lang="en-US" smtClean="0"/>
               <a:pPr/>
-              <a:t>5/25/2016</a:t>
+              <a:t>5/26/2016</a:t>
             </a:fld>
             <a:endParaRPr lang="en-US"/>
           </a:p>
@@ -3905,7 +4084,7 @@
             <a:fld id="{1D8BD707-D9CF-40AE-B4C6-C98DA3205C09}" type="datetimeFigureOut">
               <a:rPr lang="en-US" smtClean="0"/>
               <a:pPr/>
-              <a:t>5/25/2016</a:t>
+              <a:t>5/26/2016</a:t>
             </a:fld>
             <a:endParaRPr lang="en-US"/>
           </a:p>
@@ -4115,7 +4294,7 @@
             <a:fld id="{1D8BD707-D9CF-40AE-B4C6-C98DA3205C09}" type="datetimeFigureOut">
               <a:rPr lang="en-US" smtClean="0"/>
               <a:pPr/>
-              <a:t>5/25/2016</a:t>
+              <a:t>5/26/2016</a:t>
             </a:fld>
             <a:endParaRPr lang="en-US"/>
           </a:p>
@@ -4831,7 +5010,7 @@
       </p:grpSpPr>
       <p:pic>
         <p:nvPicPr>
-          <p:cNvPr id="4" name="Picture 2" descr="C:\Users\Aline\Downloads\background_40393663_468_2.jpg"/>
+          <p:cNvPr id="5" name="Picture 2" descr="C:\Users\Aline\Downloads\background_40393663_468_2.jpg"/>
           <p:cNvPicPr>
             <a:picLocks noChangeAspect="1" noChangeArrowheads="1"/>
           </p:cNvPicPr>
@@ -4857,7 +5036,7 @@
       </p:pic>
       <p:sp>
         <p:nvSpPr>
-          <p:cNvPr id="2" name="Title 1"/>
+          <p:cNvPr id="4" name="Title 1"/>
           <p:cNvSpPr>
             <a:spLocks noGrp="1"/>
           </p:cNvSpPr>
@@ -4865,28 +5044,37 @@
             <p:ph type="title"/>
           </p:nvPr>
         </p:nvSpPr>
-        <p:spPr/>
+        <p:spPr>
+          <a:xfrm>
+            <a:off x="457200" y="274638"/>
+            <a:ext cx="8229600" cy="1143000"/>
+          </a:xfrm>
+        </p:spPr>
         <p:txBody>
           <a:bodyPr>
-            <a:normAutofit fontScale="90000"/>
+            <a:normAutofit/>
           </a:bodyPr>
           <a:lstStyle/>
           <a:p>
             <a:r>
               <a:rPr lang="en-GB" b="1" dirty="0" smtClean="0"/>
-              <a:t>Results: </a:t>
-            </a:r>
-            <a:r>
-              <a:rPr lang="en-GB" dirty="0" smtClean="0"/>
-              <a:t>Speciation Initiation Rate (SIR)</a:t>
-            </a:r>
-            <a:endParaRPr lang="en-GB" dirty="0"/>
+              <a:t>Results:</a:t>
+            </a:r>
+            <a:r>
+              <a:rPr lang="en-GB" sz="2800" b="1" dirty="0" smtClean="0"/>
+              <a:t> </a:t>
+            </a:r>
+            <a:r>
+              <a:rPr lang="en-GB" sz="3200" dirty="0" smtClean="0"/>
+              <a:t>Comparison Gammas</a:t>
+            </a:r>
+            <a:endParaRPr lang="en-GB" sz="4800" dirty="0"/>
           </a:p>
         </p:txBody>
       </p:sp>
       <p:pic>
         <p:nvPicPr>
-          <p:cNvPr id="1026" name="Picture 2"/>
+          <p:cNvPr id="4098" name="Picture 2" descr="C:\Users\Aline\Dropbox\RUG 2015-2016\1.9 Community eclogy research\4. Poster_presentation\Figs and graphs ppt\Comparison plot.png"/>
           <p:cNvPicPr>
             <a:picLocks noChangeAspect="1" noChangeArrowheads="1"/>
           </p:cNvPicPr>
@@ -4901,24 +5089,18 @@
         </p:blipFill>
         <p:spPr bwMode="auto">
           <a:xfrm>
-            <a:off x="304800" y="1905000"/>
-            <a:ext cx="3810000" cy="3810000"/>
+            <a:off x="2209800" y="1371600"/>
+            <a:ext cx="4572000" cy="2537024"/>
           </a:xfrm>
           <a:prstGeom prst="rect">
             <a:avLst/>
           </a:prstGeom>
           <a:noFill/>
-          <a:ln w="9525">
-            <a:noFill/>
-            <a:miter lim="800000"/>
-            <a:headEnd/>
-            <a:tailEnd/>
-          </a:ln>
         </p:spPr>
       </p:pic>
       <p:pic>
         <p:nvPicPr>
-          <p:cNvPr id="1027" name="Picture 3"/>
+          <p:cNvPr id="4099" name="Picture 3" descr="C:\Users\Aline\Dropbox\RUG 2015-2016\1.9 Community eclogy research\4. Poster_presentation\Figs and graphs ppt\Differences Gammas.png"/>
           <p:cNvPicPr>
             <a:picLocks noChangeAspect="1" noChangeArrowheads="1"/>
           </p:cNvPicPr>
@@ -4933,19 +5115,13 @@
         </p:blipFill>
         <p:spPr bwMode="auto">
           <a:xfrm>
-            <a:off x="4800600" y="1905000"/>
-            <a:ext cx="3810000" cy="3810000"/>
+            <a:off x="2362200" y="3810000"/>
+            <a:ext cx="4394270" cy="2438400"/>
           </a:xfrm>
           <a:prstGeom prst="rect">
             <a:avLst/>
           </a:prstGeom>
           <a:noFill/>
-          <a:ln w="9525">
-            <a:noFill/>
-            <a:miter lim="800000"/>
-            <a:headEnd/>
-            <a:tailEnd/>
-          </a:ln>
         </p:spPr>
       </p:pic>
     </p:spTree>
@@ -5023,61 +5199,125 @@
           <a:p>
             <a:r>
               <a:rPr lang="en-GB" b="1" dirty="0" smtClean="0"/>
-              <a:t>Discussion &amp; Conclusions</a:t>
-            </a:r>
-            <a:endParaRPr lang="en-GB" b="1" dirty="0"/>
-          </a:p>
-        </p:txBody>
-      </p:sp>
-      <p:sp>
-        <p:nvSpPr>
-          <p:cNvPr id="3" name="Content Placeholder 2"/>
-          <p:cNvSpPr>
-            <a:spLocks noGrp="1"/>
-          </p:cNvSpPr>
-          <p:nvPr>
-            <p:ph idx="1"/>
-          </p:nvPr>
-        </p:nvSpPr>
-        <p:spPr/>
-        <p:txBody>
-          <a:bodyPr>
-            <a:normAutofit/>
+              <a:t>Results: </a:t>
+            </a:r>
+            <a:r>
+              <a:rPr lang="en-GB" sz="3200" dirty="0" smtClean="0"/>
+              <a:t>Age</a:t>
+            </a:r>
+            <a:endParaRPr lang="en-GB" dirty="0"/>
+          </a:p>
+        </p:txBody>
+      </p:sp>
+      <p:pic>
+        <p:nvPicPr>
+          <p:cNvPr id="1026" name="Picture 2" descr="C:\Users\Aline\Dropbox\RUG 2015-2016\1.9 Community eclogy research\4. Poster_presentation\Figs and graphs ppt\Age big diff.png"/>
+          <p:cNvPicPr>
+            <a:picLocks noChangeAspect="1" noChangeArrowheads="1"/>
+          </p:cNvPicPr>
+          <p:nvPr/>
+        </p:nvPicPr>
+        <p:blipFill>
+          <a:blip r:embed="rId3" cstate="print"/>
+          <a:srcRect/>
+          <a:stretch>
+            <a:fillRect/>
+          </a:stretch>
+        </p:blipFill>
+        <p:spPr bwMode="auto">
+          <a:xfrm>
+            <a:off x="2209800" y="1371600"/>
+            <a:ext cx="4394270" cy="2438400"/>
+          </a:xfrm>
+          <a:prstGeom prst="rect">
+            <a:avLst/>
+          </a:prstGeom>
+          <a:noFill/>
+        </p:spPr>
+      </p:pic>
+      <p:pic>
+        <p:nvPicPr>
+          <p:cNvPr id="1027" name="Picture 3" descr="C:\Users\Aline\Dropbox\RUG 2015-2016\1.9 Community eclogy research\4. Poster_presentation\Figs and graphs ppt\age small diff.png"/>
+          <p:cNvPicPr>
+            <a:picLocks noChangeAspect="1" noChangeArrowheads="1"/>
+          </p:cNvPicPr>
+          <p:nvPr/>
+        </p:nvPicPr>
+        <p:blipFill>
+          <a:blip r:embed="rId4" cstate="print"/>
+          <a:srcRect/>
+          <a:stretch>
+            <a:fillRect/>
+          </a:stretch>
+        </p:blipFill>
+        <p:spPr bwMode="auto">
+          <a:xfrm>
+            <a:off x="2133600" y="3962400"/>
+            <a:ext cx="4358477" cy="2418539"/>
+          </a:xfrm>
+          <a:prstGeom prst="rect">
+            <a:avLst/>
+          </a:prstGeom>
+          <a:noFill/>
+        </p:spPr>
+      </p:pic>
+      <p:sp>
+        <p:nvSpPr>
+          <p:cNvPr id="7" name="TextBox 6"/>
+          <p:cNvSpPr txBox="1"/>
+          <p:nvPr/>
+        </p:nvSpPr>
+        <p:spPr>
+          <a:xfrm>
+            <a:off x="990600" y="1981200"/>
+            <a:ext cx="1371600" cy="646331"/>
+          </a:xfrm>
+          <a:prstGeom prst="rect">
+            <a:avLst/>
+          </a:prstGeom>
+          <a:noFill/>
+        </p:spPr>
+        <p:txBody>
+          <a:bodyPr wrap="square" rtlCol="0">
+            <a:spAutoFit/>
           </a:bodyPr>
           <a:lstStyle/>
           <a:p>
-            <a:pPr>
-              <a:buNone/>
-            </a:pPr>
-            <a:r>
-              <a:rPr lang="en-GB" sz="2800" dirty="0" smtClean="0"/>
-              <a:t>Error gamma statistics: substantial</a:t>
-            </a:r>
-          </a:p>
-          <a:p>
-            <a:pPr lvl="1"/>
-            <a:r>
-              <a:rPr lang="en-GB" sz="2400" dirty="0" smtClean="0"/>
-              <a:t>Correct gamma statistics used?</a:t>
-            </a:r>
-          </a:p>
-          <a:p>
-            <a:pPr lvl="1"/>
-            <a:endParaRPr lang="nl-NL" sz="2400" dirty="0" smtClean="0"/>
-          </a:p>
-          <a:p>
-            <a:pPr lvl="1"/>
-            <a:endParaRPr lang="en-GB" sz="2400" dirty="0" smtClean="0"/>
-          </a:p>
-          <a:p>
-            <a:pPr>
-              <a:buNone/>
-            </a:pPr>
-            <a:r>
-              <a:rPr lang="en-GB" sz="2800" dirty="0" smtClean="0"/>
-              <a:t>Error ....: ??</a:t>
-            </a:r>
-            <a:endParaRPr lang="en-GB" sz="2800" dirty="0"/>
+            <a:r>
+              <a:rPr lang="nl-NL" dirty="0" smtClean="0"/>
+              <a:t>Big difference</a:t>
+            </a:r>
+            <a:endParaRPr lang="en-GB" dirty="0"/>
+          </a:p>
+        </p:txBody>
+      </p:sp>
+      <p:sp>
+        <p:nvSpPr>
+          <p:cNvPr id="8" name="TextBox 7"/>
+          <p:cNvSpPr txBox="1"/>
+          <p:nvPr/>
+        </p:nvSpPr>
+        <p:spPr>
+          <a:xfrm>
+            <a:off x="990600" y="4648200"/>
+            <a:ext cx="1371600" cy="646331"/>
+          </a:xfrm>
+          <a:prstGeom prst="rect">
+            <a:avLst/>
+          </a:prstGeom>
+          <a:noFill/>
+        </p:spPr>
+        <p:txBody>
+          <a:bodyPr wrap="square" rtlCol="0">
+            <a:spAutoFit/>
+          </a:bodyPr>
+          <a:lstStyle/>
+          <a:p>
+            <a:r>
+              <a:rPr lang="nl-NL" dirty="0" smtClean="0"/>
+              <a:t>Small difference</a:t>
+            </a:r>
+            <a:endParaRPr lang="en-GB" dirty="0"/>
           </a:p>
         </p:txBody>
       </p:sp>
@@ -5086,13 +5326,6 @@
   <p:clrMapOvr>
     <a:masterClrMapping/>
   </p:clrMapOvr>
-  <p:timing>
-    <p:tnLst>
-      <p:par>
-        <p:cTn id="1" dur="indefinite" restart="never" nodeType="tmRoot"/>
-      </p:par>
-    </p:tnLst>
-  </p:timing>
 </p:sld>
 </file>
 
@@ -5115,7 +5348,60 @@
       </p:grpSpPr>
       <p:pic>
         <p:nvPicPr>
-          <p:cNvPr id="6" name="Picture 2" descr="C:\Users\Aline\Downloads\background_40393663_468_2.jpg"/>
+          <p:cNvPr id="4" name="Picture 2" descr="C:\Users\Aline\Downloads\background_40393663_468_2.jpg"/>
+          <p:cNvPicPr>
+            <a:picLocks noChangeAspect="1" noChangeArrowheads="1"/>
+          </p:cNvPicPr>
+          <p:nvPr/>
+        </p:nvPicPr>
+        <p:blipFill>
+          <a:blip r:embed="rId2" cstate="print"/>
+          <a:srcRect/>
+          <a:stretch>
+            <a:fillRect/>
+          </a:stretch>
+        </p:blipFill>
+        <p:spPr bwMode="auto">
+          <a:xfrm>
+            <a:off x="-13063" y="0"/>
+            <a:ext cx="9170126" cy="6858000"/>
+          </a:xfrm>
+          <a:prstGeom prst="rect">
+            <a:avLst/>
+          </a:prstGeom>
+          <a:noFill/>
+        </p:spPr>
+      </p:pic>
+      <p:sp>
+        <p:nvSpPr>
+          <p:cNvPr id="2" name="Title 1"/>
+          <p:cNvSpPr>
+            <a:spLocks noGrp="1"/>
+          </p:cNvSpPr>
+          <p:nvPr>
+            <p:ph type="title"/>
+          </p:nvPr>
+        </p:nvSpPr>
+        <p:spPr/>
+        <p:txBody>
+          <a:bodyPr/>
+          <a:lstStyle/>
+          <a:p>
+            <a:r>
+              <a:rPr lang="en-GB" b="1" dirty="0" smtClean="0"/>
+              <a:t>Results: </a:t>
+            </a:r>
+            <a:r>
+              <a:rPr lang="en-GB" sz="3200" dirty="0" smtClean="0"/>
+              <a:t>Mutation Rate</a:t>
+            </a:r>
+            <a:endParaRPr lang="en-GB" sz="4800" dirty="0"/>
+          </a:p>
+        </p:txBody>
+      </p:sp>
+      <p:pic>
+        <p:nvPicPr>
+          <p:cNvPr id="2050" name="Picture 2" descr="C:\Users\Aline\Dropbox\RUG 2015-2016\1.9 Community eclogy research\4. Poster_presentation\Figs and graphs ppt\Mutation rate big diff.png"/>
           <p:cNvPicPr>
             <a:picLocks noChangeAspect="1" noChangeArrowheads="1"/>
           </p:cNvPicPr>
@@ -5130,8 +5416,8 @@
         </p:blipFill>
         <p:spPr bwMode="auto">
           <a:xfrm>
-            <a:off x="-13063" y="0"/>
-            <a:ext cx="9170126" cy="6858000"/>
+            <a:off x="2362200" y="1219200"/>
+            <a:ext cx="4381504" cy="2431316"/>
           </a:xfrm>
           <a:prstGeom prst="rect">
             <a:avLst/>
@@ -5139,32 +5425,9 @@
           <a:noFill/>
         </p:spPr>
       </p:pic>
-      <p:sp>
-        <p:nvSpPr>
-          <p:cNvPr id="2" name="Title 1"/>
-          <p:cNvSpPr>
-            <a:spLocks noGrp="1"/>
-          </p:cNvSpPr>
-          <p:nvPr>
-            <p:ph type="title"/>
-          </p:nvPr>
-        </p:nvSpPr>
-        <p:spPr/>
-        <p:txBody>
-          <a:bodyPr/>
-          <a:lstStyle/>
-          <a:p>
-            <a:r>
-              <a:rPr lang="en-GB" b="1" dirty="0" smtClean="0"/>
-              <a:t>Questions?</a:t>
-            </a:r>
-            <a:endParaRPr lang="en-GB" b="1" dirty="0"/>
-          </a:p>
-        </p:txBody>
-      </p:sp>
       <p:pic>
         <p:nvPicPr>
-          <p:cNvPr id="3075" name="Picture 3" descr="C:\Users\Aline\Downloads\tree-of-life-renee-womack.jpg"/>
+          <p:cNvPr id="2051" name="Picture 3" descr="C:\Users\Aline\Dropbox\RUG 2015-2016\1.9 Community eclogy research\4. Poster_presentation\Figs and graphs ppt\mutation rate small diff.png"/>
           <p:cNvPicPr>
             <a:picLocks noChangeAspect="1" noChangeArrowheads="1"/>
           </p:cNvPicPr>
@@ -5179,36 +5442,13 @@
         </p:blipFill>
         <p:spPr bwMode="auto">
           <a:xfrm>
-            <a:off x="2438400" y="1752600"/>
-            <a:ext cx="4254610" cy="3397779"/>
-          </a:xfrm>
-          <a:prstGeom prst="ellipse">
+            <a:off x="2362200" y="3886200"/>
+            <a:ext cx="4419600" cy="2452456"/>
+          </a:xfrm>
+          <a:prstGeom prst="rect">
             <a:avLst/>
           </a:prstGeom>
-          <a:ln w="63500" cap="rnd">
-            <a:solidFill>
-              <a:srgbClr val="333333"/>
-            </a:solidFill>
-          </a:ln>
-          <a:effectLst>
-            <a:outerShdw blurRad="381000" dist="292100" dir="5400000" sx="-80000" sy="-18000" rotWithShape="0">
-              <a:srgbClr val="000000">
-                <a:alpha val="22000"/>
-              </a:srgbClr>
-            </a:outerShdw>
-          </a:effectLst>
-          <a:scene3d>
-            <a:camera prst="orthographicFront"/>
-            <a:lightRig rig="contrasting" dir="t">
-              <a:rot lat="0" lon="0" rev="3000000"/>
-            </a:lightRig>
-          </a:scene3d>
-          <a:sp3d contourW="7620">
-            <a:bevelT w="95250" h="31750"/>
-            <a:contourClr>
-              <a:srgbClr val="333333"/>
-            </a:contourClr>
-          </a:sp3d>
+          <a:noFill/>
         </p:spPr>
       </p:pic>
     </p:spTree>
@@ -5245,7 +5485,7 @@
       </p:grpSpPr>
       <p:pic>
         <p:nvPicPr>
-          <p:cNvPr id="9" name="Picture 2" descr="C:\Users\Aline\Downloads\background_40393663_468_2.jpg"/>
+          <p:cNvPr id="4" name="Picture 2" descr="C:\Users\Aline\Downloads\background_40393663_468_2.jpg"/>
           <p:cNvPicPr>
             <a:picLocks noChangeAspect="1" noChangeArrowheads="1"/>
           </p:cNvPicPr>
@@ -5269,9 +5509,38 @@
           <a:noFill/>
         </p:spPr>
       </p:pic>
+      <p:sp>
+        <p:nvSpPr>
+          <p:cNvPr id="2" name="Title 1"/>
+          <p:cNvSpPr>
+            <a:spLocks noGrp="1"/>
+          </p:cNvSpPr>
+          <p:nvPr>
+            <p:ph type="title"/>
+          </p:nvPr>
+        </p:nvSpPr>
+        <p:spPr/>
+        <p:txBody>
+          <a:bodyPr>
+            <a:normAutofit/>
+          </a:bodyPr>
+          <a:lstStyle/>
+          <a:p>
+            <a:r>
+              <a:rPr lang="en-GB" b="1" dirty="0" smtClean="0"/>
+              <a:t>Results: </a:t>
+            </a:r>
+            <a:r>
+              <a:rPr lang="en-GB" sz="3200" dirty="0" smtClean="0"/>
+              <a:t>Speciation Initiation Rate (SIR)</a:t>
+            </a:r>
+            <a:endParaRPr lang="en-GB" sz="4800" dirty="0"/>
+          </a:p>
+        </p:txBody>
+      </p:sp>
       <p:pic>
         <p:nvPicPr>
-          <p:cNvPr id="1028" name="Picture 4" descr="C:\Users\Aline\Dropbox\RUG 2015-2016\1.9 Community eclogy research\4. Poster_presentation\Photo's\BayesianApproach.png"/>
+          <p:cNvPr id="3" name="Picture 2" descr="C:\Users\Aline\Dropbox\RUG 2015-2016\1.9 Community eclogy research\4. Poster_presentation\Figs and graphs ppt\Number of runs for Speciation Initiation Rate (SIR).png"/>
           <p:cNvPicPr>
             <a:picLocks noChangeAspect="1" noChangeArrowheads="1"/>
           </p:cNvPicPr>
@@ -5286,8 +5555,8 @@
         </p:blipFill>
         <p:spPr bwMode="auto">
           <a:xfrm>
-            <a:off x="1600200" y="3352800"/>
-            <a:ext cx="5640946" cy="914400"/>
+            <a:off x="838200" y="1676400"/>
+            <a:ext cx="7372416" cy="4090987"/>
           </a:xfrm>
           <a:prstGeom prst="rect">
             <a:avLst/>
@@ -5295,398 +5564,6 @@
           <a:noFill/>
         </p:spPr>
       </p:pic>
-      <p:sp>
-        <p:nvSpPr>
-          <p:cNvPr id="2" name="Title 1"/>
-          <p:cNvSpPr>
-            <a:spLocks noGrp="1"/>
-          </p:cNvSpPr>
-          <p:nvPr>
-            <p:ph type="title"/>
-          </p:nvPr>
-        </p:nvSpPr>
-        <p:spPr/>
-        <p:txBody>
-          <a:bodyPr/>
-          <a:lstStyle/>
-          <a:p>
-            <a:r>
-              <a:rPr lang="en-GB" dirty="0" smtClean="0"/>
-              <a:t>BEAST2</a:t>
-            </a:r>
-            <a:endParaRPr lang="en-GB" dirty="0"/>
-          </a:p>
-        </p:txBody>
-      </p:sp>
-      <p:sp>
-        <p:nvSpPr>
-          <p:cNvPr id="3" name="Content Placeholder 2"/>
-          <p:cNvSpPr>
-            <a:spLocks noGrp="1"/>
-          </p:cNvSpPr>
-          <p:nvPr>
-            <p:ph idx="1"/>
-          </p:nvPr>
-        </p:nvSpPr>
-        <p:spPr>
-          <a:xfrm>
-            <a:off x="457200" y="1600200"/>
-            <a:ext cx="8229600" cy="4648200"/>
-          </a:xfrm>
-          <a:noFill/>
-        </p:spPr>
-        <p:txBody>
-          <a:bodyPr>
-            <a:normAutofit/>
-          </a:bodyPr>
-          <a:lstStyle/>
-          <a:p>
-            <a:pPr lvl="1"/>
-            <a:r>
-              <a:rPr lang="en-GB" sz="2400" dirty="0" smtClean="0"/>
-              <a:t>Bayesian statistics</a:t>
-            </a:r>
-          </a:p>
-          <a:p>
-            <a:pPr lvl="2">
-              <a:buNone/>
-            </a:pPr>
-            <a:r>
-              <a:rPr lang="nl-NL" sz="2000" dirty="0" smtClean="0"/>
-              <a:t>MCMC</a:t>
-            </a:r>
-          </a:p>
-          <a:p>
-            <a:pPr lvl="2">
-              <a:buNone/>
-            </a:pPr>
-            <a:endParaRPr lang="nl-NL" sz="2000" dirty="0" smtClean="0"/>
-          </a:p>
-          <a:p>
-            <a:pPr lvl="2">
-              <a:buNone/>
-            </a:pPr>
-            <a:endParaRPr lang="nl-NL" sz="2000" dirty="0" smtClean="0"/>
-          </a:p>
-          <a:p>
-            <a:pPr lvl="2">
-              <a:buNone/>
-            </a:pPr>
-            <a:endParaRPr lang="nl-NL" sz="2000" dirty="0" smtClean="0"/>
-          </a:p>
-          <a:p>
-            <a:pPr lvl="2">
-              <a:buNone/>
-            </a:pPr>
-            <a:endParaRPr lang="nl-NL" sz="2000" dirty="0" smtClean="0"/>
-          </a:p>
-          <a:p>
-            <a:pPr lvl="2">
-              <a:buNone/>
-            </a:pPr>
-            <a:endParaRPr lang="nl-NL" sz="2000" dirty="0" smtClean="0"/>
-          </a:p>
-          <a:p>
-            <a:pPr lvl="2">
-              <a:buNone/>
-            </a:pPr>
-            <a:endParaRPr lang="nl-NL" sz="2000" dirty="0" smtClean="0"/>
-          </a:p>
-          <a:p>
-            <a:pPr lvl="2">
-              <a:buNone/>
-            </a:pPr>
-            <a:endParaRPr lang="nl-NL" sz="2000" dirty="0" smtClean="0"/>
-          </a:p>
-          <a:p>
-            <a:pPr lvl="2">
-              <a:buNone/>
-            </a:pPr>
-            <a:endParaRPr lang="nl-NL" sz="2000" dirty="0" smtClean="0"/>
-          </a:p>
-          <a:p>
-            <a:pPr lvl="1"/>
-            <a:r>
-              <a:rPr lang="nl-NL" sz="2400" dirty="0" smtClean="0"/>
-              <a:t>Multiple speciation models can be applied</a:t>
-            </a:r>
-          </a:p>
-          <a:p>
-            <a:pPr lvl="2">
-              <a:buNone/>
-            </a:pPr>
-            <a:r>
-              <a:rPr lang="nl-NL" sz="2000" dirty="0" smtClean="0"/>
-              <a:t>All assume </a:t>
-            </a:r>
-            <a:r>
-              <a:rPr lang="nl-NL" sz="2000" u="sng" dirty="0" smtClean="0"/>
-              <a:t>instant speciation</a:t>
-            </a:r>
-            <a:endParaRPr lang="en-GB" sz="2000" u="sng" dirty="0" smtClean="0"/>
-          </a:p>
-          <a:p>
-            <a:pPr>
-              <a:buNone/>
-            </a:pPr>
-            <a:endParaRPr lang="en-GB" dirty="0"/>
-          </a:p>
-        </p:txBody>
-      </p:sp>
-      <p:sp>
-        <p:nvSpPr>
-          <p:cNvPr id="16" name="Rectangular Callout 15"/>
-          <p:cNvSpPr/>
-          <p:nvPr/>
-        </p:nvSpPr>
-        <p:spPr>
-          <a:xfrm>
-            <a:off x="3581400" y="3048000"/>
-            <a:ext cx="914400" cy="457200"/>
-          </a:xfrm>
-          <a:prstGeom prst="wedgeRectCallout">
-            <a:avLst/>
-          </a:prstGeom>
-          <a:noFill/>
-        </p:spPr>
-        <p:style>
-          <a:lnRef idx="2">
-            <a:schemeClr val="accent1">
-              <a:shade val="50000"/>
-            </a:schemeClr>
-          </a:lnRef>
-          <a:fillRef idx="1">
-            <a:schemeClr val="accent1"/>
-          </a:fillRef>
-          <a:effectRef idx="0">
-            <a:schemeClr val="accent1"/>
-          </a:effectRef>
-          <a:fontRef idx="minor">
-            <a:schemeClr val="lt1"/>
-          </a:fontRef>
-        </p:style>
-        <p:txBody>
-          <a:bodyPr rtlCol="0" anchor="ctr"/>
-          <a:lstStyle/>
-          <a:p>
-            <a:pPr algn="ctr"/>
-            <a:r>
-              <a:rPr lang="nl-NL" dirty="0" smtClean="0">
-                <a:solidFill>
-                  <a:schemeClr val="tx2">
-                    <a:lumMod val="75000"/>
-                  </a:schemeClr>
-                </a:solidFill>
-              </a:rPr>
-              <a:t>Prior</a:t>
-            </a:r>
-            <a:endParaRPr lang="en-GB" dirty="0">
-              <a:solidFill>
-                <a:schemeClr val="tx2">
-                  <a:lumMod val="75000"/>
-                </a:schemeClr>
-              </a:solidFill>
-            </a:endParaRPr>
-          </a:p>
-        </p:txBody>
-      </p:sp>
-      <p:sp>
-        <p:nvSpPr>
-          <p:cNvPr id="17" name="Rectangular Callout 16"/>
-          <p:cNvSpPr/>
-          <p:nvPr/>
-        </p:nvSpPr>
-        <p:spPr>
-          <a:xfrm>
-            <a:off x="5029200" y="3048000"/>
-            <a:ext cx="1143000" cy="457200"/>
-          </a:xfrm>
-          <a:prstGeom prst="wedgeRectCallout">
-            <a:avLst/>
-          </a:prstGeom>
-          <a:noFill/>
-          <a:ln>
-            <a:solidFill>
-              <a:schemeClr val="tx2">
-                <a:lumMod val="60000"/>
-                <a:lumOff val="40000"/>
-              </a:schemeClr>
-            </a:solidFill>
-          </a:ln>
-        </p:spPr>
-        <p:style>
-          <a:lnRef idx="2">
-            <a:schemeClr val="accent1">
-              <a:shade val="50000"/>
-            </a:schemeClr>
-          </a:lnRef>
-          <a:fillRef idx="1">
-            <a:schemeClr val="accent1"/>
-          </a:fillRef>
-          <a:effectRef idx="0">
-            <a:schemeClr val="accent1"/>
-          </a:effectRef>
-          <a:fontRef idx="minor">
-            <a:schemeClr val="lt1"/>
-          </a:fontRef>
-        </p:style>
-        <p:txBody>
-          <a:bodyPr rtlCol="0" anchor="ctr"/>
-          <a:lstStyle/>
-          <a:p>
-            <a:pPr algn="ctr"/>
-            <a:r>
-              <a:rPr lang="nl-NL" dirty="0" smtClean="0">
-                <a:solidFill>
-                  <a:schemeClr val="tx2">
-                    <a:lumMod val="60000"/>
-                    <a:lumOff val="40000"/>
-                  </a:schemeClr>
-                </a:solidFill>
-              </a:rPr>
-              <a:t>Likelihood</a:t>
-            </a:r>
-            <a:endParaRPr lang="en-GB" dirty="0">
-              <a:solidFill>
-                <a:schemeClr val="tx2">
-                  <a:lumMod val="60000"/>
-                  <a:lumOff val="40000"/>
-                </a:schemeClr>
-              </a:solidFill>
-            </a:endParaRPr>
-          </a:p>
-        </p:txBody>
-      </p:sp>
-      <p:sp>
-        <p:nvSpPr>
-          <p:cNvPr id="18" name="Rectangular Callout 17"/>
-          <p:cNvSpPr/>
-          <p:nvPr/>
-        </p:nvSpPr>
-        <p:spPr>
-          <a:xfrm>
-            <a:off x="4572000" y="4191000"/>
-            <a:ext cx="2133600" cy="381000"/>
-          </a:xfrm>
-          <a:prstGeom prst="wedgeRectCallout">
-            <a:avLst>
-              <a:gd name="adj1" fmla="val -18308"/>
-              <a:gd name="adj2" fmla="val -77976"/>
-            </a:avLst>
-          </a:prstGeom>
-          <a:noFill/>
-          <a:ln>
-            <a:solidFill>
-              <a:schemeClr val="tx2">
-                <a:lumMod val="60000"/>
-                <a:lumOff val="40000"/>
-              </a:schemeClr>
-            </a:solidFill>
-          </a:ln>
-        </p:spPr>
-        <p:style>
-          <a:lnRef idx="2">
-            <a:schemeClr val="accent1">
-              <a:shade val="50000"/>
-            </a:schemeClr>
-          </a:lnRef>
-          <a:fillRef idx="1">
-            <a:schemeClr val="accent1"/>
-          </a:fillRef>
-          <a:effectRef idx="0">
-            <a:schemeClr val="accent1"/>
-          </a:effectRef>
-          <a:fontRef idx="minor">
-            <a:schemeClr val="lt1"/>
-          </a:fontRef>
-        </p:style>
-        <p:txBody>
-          <a:bodyPr rtlCol="0" anchor="ctr"/>
-          <a:lstStyle/>
-          <a:p>
-            <a:pPr algn="ctr"/>
-            <a:r>
-              <a:rPr lang="nl-NL" dirty="0" smtClean="0">
-                <a:solidFill>
-                  <a:schemeClr val="tx2">
-                    <a:lumMod val="60000"/>
-                    <a:lumOff val="40000"/>
-                  </a:schemeClr>
-                </a:solidFill>
-              </a:rPr>
-              <a:t>Marginal probability</a:t>
-            </a:r>
-            <a:endParaRPr lang="en-GB" dirty="0">
-              <a:solidFill>
-                <a:schemeClr val="tx2">
-                  <a:lumMod val="60000"/>
-                  <a:lumOff val="40000"/>
-                </a:schemeClr>
-              </a:solidFill>
-            </a:endParaRPr>
-          </a:p>
-        </p:txBody>
-      </p:sp>
-      <p:sp>
-        <p:nvSpPr>
-          <p:cNvPr id="19" name="Rectangular Callout 18"/>
-          <p:cNvSpPr/>
-          <p:nvPr/>
-        </p:nvSpPr>
-        <p:spPr>
-          <a:xfrm>
-            <a:off x="1676400" y="3048000"/>
-            <a:ext cx="1066800" cy="533400"/>
-          </a:xfrm>
-          <a:prstGeom prst="wedgeRectCallout">
-            <a:avLst>
-              <a:gd name="adj1" fmla="val -20833"/>
-              <a:gd name="adj2" fmla="val 67262"/>
-            </a:avLst>
-          </a:prstGeom>
-          <a:noFill/>
-        </p:spPr>
-        <p:style>
-          <a:lnRef idx="2">
-            <a:schemeClr val="accent1">
-              <a:shade val="50000"/>
-            </a:schemeClr>
-          </a:lnRef>
-          <a:fillRef idx="1">
-            <a:schemeClr val="accent1"/>
-          </a:fillRef>
-          <a:effectRef idx="0">
-            <a:schemeClr val="accent1"/>
-          </a:effectRef>
-          <a:fontRef idx="minor">
-            <a:schemeClr val="lt1"/>
-          </a:fontRef>
-        </p:style>
-        <p:txBody>
-          <a:bodyPr rtlCol="0" anchor="ctr"/>
-          <a:lstStyle/>
-          <a:p>
-            <a:pPr algn="ctr"/>
-            <a:r>
-              <a:rPr lang="nl-NL" dirty="0" smtClean="0">
-                <a:solidFill>
-                  <a:schemeClr val="tx2">
-                    <a:lumMod val="75000"/>
-                  </a:schemeClr>
-                </a:solidFill>
-              </a:rPr>
-              <a:t>Posterior</a:t>
-            </a:r>
-            <a:endParaRPr lang="en-GB" dirty="0">
-              <a:solidFill>
-                <a:schemeClr val="tx2">
-                  <a:lumMod val="75000"/>
-                </a:schemeClr>
-              </a:solidFill>
-            </a:endParaRPr>
-          </a:p>
-        </p:txBody>
-      </p:sp>
     </p:spTree>
   </p:cSld>
   <p:clrMapOvr>
@@ -5719,32 +5596,69 @@
           <a:chExt cx="0" cy="0"/>
         </a:xfrm>
       </p:grpSpPr>
-      <p:sp>
-        <p:nvSpPr>
-          <p:cNvPr id="2" name="Title 1"/>
-          <p:cNvSpPr>
-            <a:spLocks noGrp="1"/>
-          </p:cNvSpPr>
-          <p:nvPr>
-            <p:ph type="title"/>
-          </p:nvPr>
-        </p:nvSpPr>
-        <p:spPr/>
-        <p:txBody>
-          <a:bodyPr/>
-          <a:lstStyle/>
-          <a:p>
-            <a:r>
-              <a:rPr lang="nl-NL" dirty="0" smtClean="0"/>
-              <a:t>GitHub</a:t>
-            </a:r>
-            <a:endParaRPr lang="en-GB" dirty="0"/>
-          </a:p>
-        </p:txBody>
-      </p:sp>
       <p:pic>
         <p:nvPicPr>
-          <p:cNvPr id="21505" name="Picture 1" descr="C:\Users\Aline\Dropbox\RUG 2015-2016\1.9 Community eclogy research\4. Poster_presentation\Photo's\RichelsGitHub.png"/>
+          <p:cNvPr id="6" name="Picture 2" descr="C:\Users\Aline\Downloads\background_40393663_468_2.jpg"/>
+          <p:cNvPicPr>
+            <a:picLocks noChangeAspect="1" noChangeArrowheads="1"/>
+          </p:cNvPicPr>
+          <p:nvPr/>
+        </p:nvPicPr>
+        <p:blipFill>
+          <a:blip r:embed="rId2" cstate="print"/>
+          <a:srcRect/>
+          <a:stretch>
+            <a:fillRect/>
+          </a:stretch>
+        </p:blipFill>
+        <p:spPr bwMode="auto">
+          <a:xfrm>
+            <a:off x="-13063" y="0"/>
+            <a:ext cx="9170126" cy="6858000"/>
+          </a:xfrm>
+          <a:prstGeom prst="rect">
+            <a:avLst/>
+          </a:prstGeom>
+          <a:noFill/>
+        </p:spPr>
+      </p:pic>
+      <p:sp>
+        <p:nvSpPr>
+          <p:cNvPr id="4" name="Title 1"/>
+          <p:cNvSpPr>
+            <a:spLocks noGrp="1"/>
+          </p:cNvSpPr>
+          <p:nvPr>
+            <p:ph type="title"/>
+          </p:nvPr>
+        </p:nvSpPr>
+        <p:spPr>
+          <a:xfrm>
+            <a:off x="457200" y="274638"/>
+            <a:ext cx="8229600" cy="1143000"/>
+          </a:xfrm>
+        </p:spPr>
+        <p:txBody>
+          <a:bodyPr>
+            <a:normAutofit/>
+          </a:bodyPr>
+          <a:lstStyle/>
+          <a:p>
+            <a:r>
+              <a:rPr lang="en-GB" b="1" dirty="0" smtClean="0"/>
+              <a:t>Results: </a:t>
+            </a:r>
+            <a:r>
+              <a:rPr lang="en-GB" sz="3200" dirty="0" smtClean="0"/>
+              <a:t>Speciation Completion Rate (SCR)</a:t>
+            </a:r>
+            <a:endParaRPr lang="en-GB" sz="4800" dirty="0"/>
+          </a:p>
+        </p:txBody>
+      </p:sp>
+      <p:pic>
+        <p:nvPicPr>
+          <p:cNvPr id="2050" name="Picture 2" descr="C:\Users\Aline\Dropbox\RUG 2015-2016\1.9 Community eclogy research\4. Poster_presentation\Figs and graphs ppt\Number of runs for Speciation Completion Rate (SCR).png"/>
           <p:cNvPicPr>
             <a:picLocks noChangeAspect="1" noChangeArrowheads="1"/>
           </p:cNvPicPr>
@@ -5759,8 +5673,34 @@
         </p:blipFill>
         <p:spPr bwMode="auto">
           <a:xfrm>
-            <a:off x="228600" y="1219200"/>
-            <a:ext cx="4495800" cy="3114699"/>
+            <a:off x="2286000" y="1143000"/>
+            <a:ext cx="4724400" cy="2621591"/>
+          </a:xfrm>
+          <a:prstGeom prst="rect">
+            <a:avLst/>
+          </a:prstGeom>
+          <a:noFill/>
+        </p:spPr>
+      </p:pic>
+      <p:pic>
+        <p:nvPicPr>
+          <p:cNvPr id="2051" name="Picture 3" descr="C:\Users\Aline\Dropbox\RUG 2015-2016\1.9 Community eclogy research\4. Poster_presentation\Figs and graphs ppt\Number of runs for Speciation Completion Rate (SCR)2.png"/>
+          <p:cNvPicPr>
+            <a:picLocks noChangeAspect="1" noChangeArrowheads="1"/>
+          </p:cNvPicPr>
+          <p:nvPr/>
+        </p:nvPicPr>
+        <p:blipFill>
+          <a:blip r:embed="rId4" cstate="print"/>
+          <a:srcRect/>
+          <a:stretch>
+            <a:fillRect/>
+          </a:stretch>
+        </p:blipFill>
+        <p:spPr bwMode="auto">
+          <a:xfrm>
+            <a:off x="2286000" y="3886200"/>
+            <a:ext cx="4716462" cy="2617186"/>
           </a:xfrm>
           <a:prstGeom prst="rect">
             <a:avLst/>
@@ -5784,6 +5724,874 @@
 </file>
 
 <file path=ppt/slides/slide15.xml><?xml version="1.0" encoding="utf-8"?>
+<p:sld xmlns:a="http://schemas.openxmlformats.org/drawingml/2006/main" xmlns:r="http://schemas.openxmlformats.org/officeDocument/2006/relationships" xmlns:p="http://schemas.openxmlformats.org/presentationml/2006/main">
+  <p:cSld>
+    <p:spTree>
+      <p:nvGrpSpPr>
+        <p:cNvPr id="1" name=""/>
+        <p:cNvGrpSpPr/>
+        <p:nvPr/>
+      </p:nvGrpSpPr>
+      <p:grpSpPr>
+        <a:xfrm>
+          <a:off x="0" y="0"/>
+          <a:ext cx="0" cy="0"/>
+          <a:chOff x="0" y="0"/>
+          <a:chExt cx="0" cy="0"/>
+        </a:xfrm>
+      </p:grpSpPr>
+      <p:pic>
+        <p:nvPicPr>
+          <p:cNvPr id="6" name="Picture 2" descr="C:\Users\Aline\Downloads\background_40393663_468_2.jpg"/>
+          <p:cNvPicPr>
+            <a:picLocks noChangeAspect="1" noChangeArrowheads="1"/>
+          </p:cNvPicPr>
+          <p:nvPr/>
+        </p:nvPicPr>
+        <p:blipFill>
+          <a:blip r:embed="rId2" cstate="print"/>
+          <a:srcRect/>
+          <a:stretch>
+            <a:fillRect/>
+          </a:stretch>
+        </p:blipFill>
+        <p:spPr bwMode="auto">
+          <a:xfrm>
+            <a:off x="-13063" y="0"/>
+            <a:ext cx="9170126" cy="6858000"/>
+          </a:xfrm>
+          <a:prstGeom prst="rect">
+            <a:avLst/>
+          </a:prstGeom>
+          <a:noFill/>
+        </p:spPr>
+      </p:pic>
+      <p:pic>
+        <p:nvPicPr>
+          <p:cNvPr id="3074" name="Picture 2" descr="C:\Users\Aline\Dropbox\RUG 2015-2016\1.9 Community eclogy research\4. Poster_presentation\Figs and graphs ppt\Distribution of BD gammas.png"/>
+          <p:cNvPicPr>
+            <a:picLocks noChangeAspect="1" noChangeArrowheads="1"/>
+          </p:cNvPicPr>
+          <p:nvPr/>
+        </p:nvPicPr>
+        <p:blipFill>
+          <a:blip r:embed="rId3" cstate="print"/>
+          <a:srcRect/>
+          <a:stretch>
+            <a:fillRect/>
+          </a:stretch>
+        </p:blipFill>
+        <p:spPr bwMode="auto">
+          <a:xfrm>
+            <a:off x="2133600" y="1075166"/>
+            <a:ext cx="4876800" cy="2706159"/>
+          </a:xfrm>
+          <a:prstGeom prst="rect">
+            <a:avLst/>
+          </a:prstGeom>
+          <a:noFill/>
+        </p:spPr>
+      </p:pic>
+      <p:pic>
+        <p:nvPicPr>
+          <p:cNvPr id="3075" name="Picture 3" descr="C:\Users\Aline\Dropbox\RUG 2015-2016\1.9 Community eclogy research\4. Poster_presentation\Figs and graphs ppt\Distribution of PBD gammas.png"/>
+          <p:cNvPicPr>
+            <a:picLocks noChangeAspect="1" noChangeArrowheads="1"/>
+          </p:cNvPicPr>
+          <p:nvPr/>
+        </p:nvPicPr>
+        <p:blipFill>
+          <a:blip r:embed="rId4" cstate="print"/>
+          <a:srcRect/>
+          <a:stretch>
+            <a:fillRect/>
+          </a:stretch>
+        </p:blipFill>
+        <p:spPr bwMode="auto">
+          <a:xfrm>
+            <a:off x="2133600" y="3810000"/>
+            <a:ext cx="4876800" cy="2706159"/>
+          </a:xfrm>
+          <a:prstGeom prst="rect">
+            <a:avLst/>
+          </a:prstGeom>
+          <a:noFill/>
+        </p:spPr>
+      </p:pic>
+      <p:sp>
+        <p:nvSpPr>
+          <p:cNvPr id="7" name="Title 1"/>
+          <p:cNvSpPr>
+            <a:spLocks noGrp="1"/>
+          </p:cNvSpPr>
+          <p:nvPr>
+            <p:ph type="title"/>
+          </p:nvPr>
+        </p:nvSpPr>
+        <p:spPr>
+          <a:xfrm>
+            <a:off x="457200" y="274638"/>
+            <a:ext cx="8229600" cy="1143000"/>
+          </a:xfrm>
+        </p:spPr>
+        <p:txBody>
+          <a:bodyPr>
+            <a:normAutofit/>
+          </a:bodyPr>
+          <a:lstStyle/>
+          <a:p>
+            <a:r>
+              <a:rPr lang="en-GB" b="1" dirty="0" smtClean="0"/>
+              <a:t>Results: </a:t>
+            </a:r>
+            <a:r>
+              <a:rPr lang="en-GB" sz="3200" dirty="0" smtClean="0"/>
+              <a:t>Gamma Distribution</a:t>
+            </a:r>
+            <a:endParaRPr lang="en-GB" sz="4800" dirty="0"/>
+          </a:p>
+        </p:txBody>
+      </p:sp>
+    </p:spTree>
+  </p:cSld>
+  <p:clrMapOvr>
+    <a:masterClrMapping/>
+  </p:clrMapOvr>
+  <p:timing>
+    <p:tnLst>
+      <p:par>
+        <p:cTn id="1" dur="indefinite" restart="never" nodeType="tmRoot"/>
+      </p:par>
+    </p:tnLst>
+  </p:timing>
+</p:sld>
+</file>
+
+<file path=ppt/slides/slide16.xml><?xml version="1.0" encoding="utf-8"?>
+<p:sld xmlns:a="http://schemas.openxmlformats.org/drawingml/2006/main" xmlns:r="http://schemas.openxmlformats.org/officeDocument/2006/relationships" xmlns:p="http://schemas.openxmlformats.org/presentationml/2006/main">
+  <p:cSld>
+    <p:spTree>
+      <p:nvGrpSpPr>
+        <p:cNvPr id="1" name=""/>
+        <p:cNvGrpSpPr/>
+        <p:nvPr/>
+      </p:nvGrpSpPr>
+      <p:grpSpPr>
+        <a:xfrm>
+          <a:off x="0" y="0"/>
+          <a:ext cx="0" cy="0"/>
+          <a:chOff x="0" y="0"/>
+          <a:chExt cx="0" cy="0"/>
+        </a:xfrm>
+      </p:grpSpPr>
+      <p:pic>
+        <p:nvPicPr>
+          <p:cNvPr id="4" name="Picture 2" descr="C:\Users\Aline\Downloads\background_40393663_468_2.jpg"/>
+          <p:cNvPicPr>
+            <a:picLocks noChangeAspect="1" noChangeArrowheads="1"/>
+          </p:cNvPicPr>
+          <p:nvPr/>
+        </p:nvPicPr>
+        <p:blipFill>
+          <a:blip r:embed="rId2" cstate="print"/>
+          <a:srcRect/>
+          <a:stretch>
+            <a:fillRect/>
+          </a:stretch>
+        </p:blipFill>
+        <p:spPr bwMode="auto">
+          <a:xfrm>
+            <a:off x="-13063" y="0"/>
+            <a:ext cx="9170126" cy="6858000"/>
+          </a:xfrm>
+          <a:prstGeom prst="rect">
+            <a:avLst/>
+          </a:prstGeom>
+          <a:noFill/>
+        </p:spPr>
+      </p:pic>
+      <p:sp>
+        <p:nvSpPr>
+          <p:cNvPr id="2" name="Title 1"/>
+          <p:cNvSpPr>
+            <a:spLocks noGrp="1"/>
+          </p:cNvSpPr>
+          <p:nvPr>
+            <p:ph type="title"/>
+          </p:nvPr>
+        </p:nvSpPr>
+        <p:spPr/>
+        <p:txBody>
+          <a:bodyPr/>
+          <a:lstStyle/>
+          <a:p>
+            <a:r>
+              <a:rPr lang="en-GB" b="1" dirty="0" smtClean="0"/>
+              <a:t>Discussion &amp; Conclusions</a:t>
+            </a:r>
+            <a:endParaRPr lang="en-GB" b="1" dirty="0"/>
+          </a:p>
+        </p:txBody>
+      </p:sp>
+      <p:sp>
+        <p:nvSpPr>
+          <p:cNvPr id="3" name="Content Placeholder 2"/>
+          <p:cNvSpPr>
+            <a:spLocks noGrp="1"/>
+          </p:cNvSpPr>
+          <p:nvPr>
+            <p:ph idx="1"/>
+          </p:nvPr>
+        </p:nvSpPr>
+        <p:spPr/>
+        <p:txBody>
+          <a:bodyPr>
+            <a:normAutofit/>
+          </a:bodyPr>
+          <a:lstStyle/>
+          <a:p>
+            <a:pPr>
+              <a:buNone/>
+            </a:pPr>
+            <a:r>
+              <a:rPr lang="en-GB" sz="2800" dirty="0" smtClean="0"/>
+              <a:t>Error gamma statistics: substantial</a:t>
+            </a:r>
+          </a:p>
+          <a:p>
+            <a:pPr lvl="1">
+              <a:buNone/>
+            </a:pPr>
+            <a:endParaRPr lang="nl-NL" sz="2400" dirty="0" smtClean="0"/>
+          </a:p>
+          <a:p>
+            <a:pPr lvl="1"/>
+            <a:endParaRPr lang="en-GB" sz="2400" dirty="0" smtClean="0"/>
+          </a:p>
+        </p:txBody>
+      </p:sp>
+    </p:spTree>
+  </p:cSld>
+  <p:clrMapOvr>
+    <a:masterClrMapping/>
+  </p:clrMapOvr>
+  <p:timing>
+    <p:tnLst>
+      <p:par>
+        <p:cTn id="1" dur="indefinite" restart="never" nodeType="tmRoot"/>
+      </p:par>
+    </p:tnLst>
+  </p:timing>
+</p:sld>
+</file>
+
+<file path=ppt/slides/slide17.xml><?xml version="1.0" encoding="utf-8"?>
+<p:sld xmlns:a="http://schemas.openxmlformats.org/drawingml/2006/main" xmlns:r="http://schemas.openxmlformats.org/officeDocument/2006/relationships" xmlns:p="http://schemas.openxmlformats.org/presentationml/2006/main">
+  <p:cSld>
+    <p:spTree>
+      <p:nvGrpSpPr>
+        <p:cNvPr id="1" name=""/>
+        <p:cNvGrpSpPr/>
+        <p:nvPr/>
+      </p:nvGrpSpPr>
+      <p:grpSpPr>
+        <a:xfrm>
+          <a:off x="0" y="0"/>
+          <a:ext cx="0" cy="0"/>
+          <a:chOff x="0" y="0"/>
+          <a:chExt cx="0" cy="0"/>
+        </a:xfrm>
+      </p:grpSpPr>
+      <p:pic>
+        <p:nvPicPr>
+          <p:cNvPr id="6" name="Picture 2" descr="C:\Users\Aline\Downloads\background_40393663_468_2.jpg"/>
+          <p:cNvPicPr>
+            <a:picLocks noChangeAspect="1" noChangeArrowheads="1"/>
+          </p:cNvPicPr>
+          <p:nvPr/>
+        </p:nvPicPr>
+        <p:blipFill>
+          <a:blip r:embed="rId3" cstate="print"/>
+          <a:srcRect/>
+          <a:stretch>
+            <a:fillRect/>
+          </a:stretch>
+        </p:blipFill>
+        <p:spPr bwMode="auto">
+          <a:xfrm>
+            <a:off x="-13063" y="0"/>
+            <a:ext cx="9170126" cy="6858000"/>
+          </a:xfrm>
+          <a:prstGeom prst="rect">
+            <a:avLst/>
+          </a:prstGeom>
+          <a:noFill/>
+        </p:spPr>
+      </p:pic>
+      <p:sp>
+        <p:nvSpPr>
+          <p:cNvPr id="2" name="Title 1"/>
+          <p:cNvSpPr>
+            <a:spLocks noGrp="1"/>
+          </p:cNvSpPr>
+          <p:nvPr>
+            <p:ph type="title"/>
+          </p:nvPr>
+        </p:nvSpPr>
+        <p:spPr/>
+        <p:txBody>
+          <a:bodyPr/>
+          <a:lstStyle/>
+          <a:p>
+            <a:r>
+              <a:rPr lang="en-GB" b="1" dirty="0" smtClean="0"/>
+              <a:t>Questions</a:t>
+            </a:r>
+            <a:endParaRPr lang="en-GB" b="1" dirty="0"/>
+          </a:p>
+        </p:txBody>
+      </p:sp>
+      <p:pic>
+        <p:nvPicPr>
+          <p:cNvPr id="3075" name="Picture 3" descr="C:\Users\Aline\Downloads\tree-of-life-renee-womack.jpg"/>
+          <p:cNvPicPr>
+            <a:picLocks noChangeAspect="1" noChangeArrowheads="1"/>
+          </p:cNvPicPr>
+          <p:nvPr/>
+        </p:nvPicPr>
+        <p:blipFill>
+          <a:blip r:embed="rId4" cstate="print"/>
+          <a:srcRect/>
+          <a:stretch>
+            <a:fillRect/>
+          </a:stretch>
+        </p:blipFill>
+        <p:spPr bwMode="auto">
+          <a:xfrm>
+            <a:off x="2438400" y="1752600"/>
+            <a:ext cx="4254610" cy="3397779"/>
+          </a:xfrm>
+          <a:prstGeom prst="ellipse">
+            <a:avLst/>
+          </a:prstGeom>
+          <a:ln w="63500" cap="rnd">
+            <a:solidFill>
+              <a:srgbClr val="333333"/>
+            </a:solidFill>
+          </a:ln>
+          <a:effectLst>
+            <a:outerShdw blurRad="381000" dist="292100" dir="5400000" sx="-80000" sy="-18000" rotWithShape="0">
+              <a:srgbClr val="000000">
+                <a:alpha val="22000"/>
+              </a:srgbClr>
+            </a:outerShdw>
+          </a:effectLst>
+          <a:scene3d>
+            <a:camera prst="orthographicFront"/>
+            <a:lightRig rig="contrasting" dir="t">
+              <a:rot lat="0" lon="0" rev="3000000"/>
+            </a:lightRig>
+          </a:scene3d>
+          <a:sp3d contourW="7620">
+            <a:bevelT w="95250" h="31750"/>
+            <a:contourClr>
+              <a:srgbClr val="333333"/>
+            </a:contourClr>
+          </a:sp3d>
+        </p:spPr>
+      </p:pic>
+    </p:spTree>
+  </p:cSld>
+  <p:clrMapOvr>
+    <a:masterClrMapping/>
+  </p:clrMapOvr>
+  <p:timing>
+    <p:tnLst>
+      <p:par>
+        <p:cTn id="1" dur="indefinite" restart="never" nodeType="tmRoot"/>
+      </p:par>
+    </p:tnLst>
+  </p:timing>
+</p:sld>
+</file>
+
+<file path=ppt/slides/slide18.xml><?xml version="1.0" encoding="utf-8"?>
+<p:sld xmlns:a="http://schemas.openxmlformats.org/drawingml/2006/main" xmlns:r="http://schemas.openxmlformats.org/officeDocument/2006/relationships" xmlns:p="http://schemas.openxmlformats.org/presentationml/2006/main">
+  <p:cSld>
+    <p:spTree>
+      <p:nvGrpSpPr>
+        <p:cNvPr id="1" name=""/>
+        <p:cNvGrpSpPr/>
+        <p:nvPr/>
+      </p:nvGrpSpPr>
+      <p:grpSpPr>
+        <a:xfrm>
+          <a:off x="0" y="0"/>
+          <a:ext cx="0" cy="0"/>
+          <a:chOff x="0" y="0"/>
+          <a:chExt cx="0" cy="0"/>
+        </a:xfrm>
+      </p:grpSpPr>
+      <p:pic>
+        <p:nvPicPr>
+          <p:cNvPr id="9" name="Picture 2" descr="C:\Users\Aline\Downloads\background_40393663_468_2.jpg"/>
+          <p:cNvPicPr>
+            <a:picLocks noChangeAspect="1" noChangeArrowheads="1"/>
+          </p:cNvPicPr>
+          <p:nvPr/>
+        </p:nvPicPr>
+        <p:blipFill>
+          <a:blip r:embed="rId3" cstate="print"/>
+          <a:srcRect/>
+          <a:stretch>
+            <a:fillRect/>
+          </a:stretch>
+        </p:blipFill>
+        <p:spPr bwMode="auto">
+          <a:xfrm>
+            <a:off x="-13063" y="0"/>
+            <a:ext cx="9170126" cy="6858000"/>
+          </a:xfrm>
+          <a:prstGeom prst="rect">
+            <a:avLst/>
+          </a:prstGeom>
+          <a:noFill/>
+        </p:spPr>
+      </p:pic>
+      <p:pic>
+        <p:nvPicPr>
+          <p:cNvPr id="1028" name="Picture 4" descr="C:\Users\Aline\Dropbox\RUG 2015-2016\1.9 Community eclogy research\4. Poster_presentation\Photo's\BayesianApproach.png"/>
+          <p:cNvPicPr>
+            <a:picLocks noChangeAspect="1" noChangeArrowheads="1"/>
+          </p:cNvPicPr>
+          <p:nvPr/>
+        </p:nvPicPr>
+        <p:blipFill>
+          <a:blip r:embed="rId4" cstate="print"/>
+          <a:srcRect/>
+          <a:stretch>
+            <a:fillRect/>
+          </a:stretch>
+        </p:blipFill>
+        <p:spPr bwMode="auto">
+          <a:xfrm>
+            <a:off x="1600200" y="3352800"/>
+            <a:ext cx="5640946" cy="914400"/>
+          </a:xfrm>
+          <a:prstGeom prst="rect">
+            <a:avLst/>
+          </a:prstGeom>
+          <a:noFill/>
+        </p:spPr>
+      </p:pic>
+      <p:sp>
+        <p:nvSpPr>
+          <p:cNvPr id="2" name="Title 1"/>
+          <p:cNvSpPr>
+            <a:spLocks noGrp="1"/>
+          </p:cNvSpPr>
+          <p:nvPr>
+            <p:ph type="title"/>
+          </p:nvPr>
+        </p:nvSpPr>
+        <p:spPr/>
+        <p:txBody>
+          <a:bodyPr/>
+          <a:lstStyle/>
+          <a:p>
+            <a:r>
+              <a:rPr lang="en-GB" dirty="0" smtClean="0"/>
+              <a:t>BEAST2</a:t>
+            </a:r>
+            <a:endParaRPr lang="en-GB" dirty="0"/>
+          </a:p>
+        </p:txBody>
+      </p:sp>
+      <p:sp>
+        <p:nvSpPr>
+          <p:cNvPr id="3" name="Content Placeholder 2"/>
+          <p:cNvSpPr>
+            <a:spLocks noGrp="1"/>
+          </p:cNvSpPr>
+          <p:nvPr>
+            <p:ph idx="1"/>
+          </p:nvPr>
+        </p:nvSpPr>
+        <p:spPr>
+          <a:xfrm>
+            <a:off x="457200" y="1600200"/>
+            <a:ext cx="8229600" cy="4648200"/>
+          </a:xfrm>
+          <a:noFill/>
+        </p:spPr>
+        <p:txBody>
+          <a:bodyPr>
+            <a:normAutofit/>
+          </a:bodyPr>
+          <a:lstStyle/>
+          <a:p>
+            <a:pPr lvl="1"/>
+            <a:r>
+              <a:rPr lang="en-GB" sz="2400" dirty="0" smtClean="0"/>
+              <a:t>Bayesian statistics</a:t>
+            </a:r>
+          </a:p>
+          <a:p>
+            <a:pPr lvl="2">
+              <a:buNone/>
+            </a:pPr>
+            <a:r>
+              <a:rPr lang="nl-NL" sz="2000" dirty="0" smtClean="0"/>
+              <a:t>MCMC</a:t>
+            </a:r>
+          </a:p>
+          <a:p>
+            <a:pPr lvl="2">
+              <a:buNone/>
+            </a:pPr>
+            <a:endParaRPr lang="nl-NL" sz="2000" dirty="0" smtClean="0"/>
+          </a:p>
+          <a:p>
+            <a:pPr lvl="2">
+              <a:buNone/>
+            </a:pPr>
+            <a:endParaRPr lang="nl-NL" sz="2000" dirty="0" smtClean="0"/>
+          </a:p>
+          <a:p>
+            <a:pPr lvl="2">
+              <a:buNone/>
+            </a:pPr>
+            <a:endParaRPr lang="nl-NL" sz="2000" dirty="0" smtClean="0"/>
+          </a:p>
+          <a:p>
+            <a:pPr lvl="2">
+              <a:buNone/>
+            </a:pPr>
+            <a:endParaRPr lang="nl-NL" sz="2000" dirty="0" smtClean="0"/>
+          </a:p>
+          <a:p>
+            <a:pPr lvl="2">
+              <a:buNone/>
+            </a:pPr>
+            <a:endParaRPr lang="nl-NL" sz="2000" dirty="0" smtClean="0"/>
+          </a:p>
+          <a:p>
+            <a:pPr lvl="2">
+              <a:buNone/>
+            </a:pPr>
+            <a:endParaRPr lang="nl-NL" sz="2000" dirty="0" smtClean="0"/>
+          </a:p>
+          <a:p>
+            <a:pPr lvl="2">
+              <a:buNone/>
+            </a:pPr>
+            <a:endParaRPr lang="nl-NL" sz="2000" dirty="0" smtClean="0"/>
+          </a:p>
+          <a:p>
+            <a:pPr lvl="2">
+              <a:buNone/>
+            </a:pPr>
+            <a:endParaRPr lang="nl-NL" sz="2000" dirty="0" smtClean="0"/>
+          </a:p>
+          <a:p>
+            <a:pPr lvl="1"/>
+            <a:r>
+              <a:rPr lang="nl-NL" sz="2400" dirty="0" smtClean="0"/>
+              <a:t>Multiple speciation models can be applied</a:t>
+            </a:r>
+          </a:p>
+          <a:p>
+            <a:pPr lvl="2">
+              <a:buNone/>
+            </a:pPr>
+            <a:r>
+              <a:rPr lang="nl-NL" sz="2000" dirty="0" smtClean="0"/>
+              <a:t>All assume </a:t>
+            </a:r>
+            <a:r>
+              <a:rPr lang="nl-NL" sz="2000" u="sng" dirty="0" smtClean="0"/>
+              <a:t>instant speciation</a:t>
+            </a:r>
+            <a:endParaRPr lang="en-GB" sz="2000" u="sng" dirty="0" smtClean="0"/>
+          </a:p>
+          <a:p>
+            <a:pPr>
+              <a:buNone/>
+            </a:pPr>
+            <a:endParaRPr lang="en-GB" dirty="0"/>
+          </a:p>
+        </p:txBody>
+      </p:sp>
+      <p:sp>
+        <p:nvSpPr>
+          <p:cNvPr id="16" name="Rectangular Callout 15"/>
+          <p:cNvSpPr/>
+          <p:nvPr/>
+        </p:nvSpPr>
+        <p:spPr>
+          <a:xfrm>
+            <a:off x="3581400" y="3048000"/>
+            <a:ext cx="914400" cy="457200"/>
+          </a:xfrm>
+          <a:prstGeom prst="wedgeRectCallout">
+            <a:avLst/>
+          </a:prstGeom>
+          <a:noFill/>
+        </p:spPr>
+        <p:style>
+          <a:lnRef idx="2">
+            <a:schemeClr val="accent1">
+              <a:shade val="50000"/>
+            </a:schemeClr>
+          </a:lnRef>
+          <a:fillRef idx="1">
+            <a:schemeClr val="accent1"/>
+          </a:fillRef>
+          <a:effectRef idx="0">
+            <a:schemeClr val="accent1"/>
+          </a:effectRef>
+          <a:fontRef idx="minor">
+            <a:schemeClr val="lt1"/>
+          </a:fontRef>
+        </p:style>
+        <p:txBody>
+          <a:bodyPr rtlCol="0" anchor="ctr"/>
+          <a:lstStyle/>
+          <a:p>
+            <a:pPr algn="ctr"/>
+            <a:r>
+              <a:rPr lang="nl-NL" dirty="0" smtClean="0">
+                <a:solidFill>
+                  <a:schemeClr val="tx2">
+                    <a:lumMod val="75000"/>
+                  </a:schemeClr>
+                </a:solidFill>
+              </a:rPr>
+              <a:t>Prior</a:t>
+            </a:r>
+            <a:endParaRPr lang="en-GB" dirty="0">
+              <a:solidFill>
+                <a:schemeClr val="tx2">
+                  <a:lumMod val="75000"/>
+                </a:schemeClr>
+              </a:solidFill>
+            </a:endParaRPr>
+          </a:p>
+        </p:txBody>
+      </p:sp>
+      <p:sp>
+        <p:nvSpPr>
+          <p:cNvPr id="17" name="Rectangular Callout 16"/>
+          <p:cNvSpPr/>
+          <p:nvPr/>
+        </p:nvSpPr>
+        <p:spPr>
+          <a:xfrm>
+            <a:off x="5029200" y="3048000"/>
+            <a:ext cx="1143000" cy="457200"/>
+          </a:xfrm>
+          <a:prstGeom prst="wedgeRectCallout">
+            <a:avLst/>
+          </a:prstGeom>
+          <a:noFill/>
+          <a:ln>
+            <a:solidFill>
+              <a:schemeClr val="tx2">
+                <a:lumMod val="60000"/>
+                <a:lumOff val="40000"/>
+              </a:schemeClr>
+            </a:solidFill>
+          </a:ln>
+        </p:spPr>
+        <p:style>
+          <a:lnRef idx="2">
+            <a:schemeClr val="accent1">
+              <a:shade val="50000"/>
+            </a:schemeClr>
+          </a:lnRef>
+          <a:fillRef idx="1">
+            <a:schemeClr val="accent1"/>
+          </a:fillRef>
+          <a:effectRef idx="0">
+            <a:schemeClr val="accent1"/>
+          </a:effectRef>
+          <a:fontRef idx="minor">
+            <a:schemeClr val="lt1"/>
+          </a:fontRef>
+        </p:style>
+        <p:txBody>
+          <a:bodyPr rtlCol="0" anchor="ctr"/>
+          <a:lstStyle/>
+          <a:p>
+            <a:pPr algn="ctr"/>
+            <a:r>
+              <a:rPr lang="nl-NL" dirty="0" smtClean="0">
+                <a:solidFill>
+                  <a:schemeClr val="tx2">
+                    <a:lumMod val="60000"/>
+                    <a:lumOff val="40000"/>
+                  </a:schemeClr>
+                </a:solidFill>
+              </a:rPr>
+              <a:t>Likelihood</a:t>
+            </a:r>
+            <a:endParaRPr lang="en-GB" dirty="0">
+              <a:solidFill>
+                <a:schemeClr val="tx2">
+                  <a:lumMod val="60000"/>
+                  <a:lumOff val="40000"/>
+                </a:schemeClr>
+              </a:solidFill>
+            </a:endParaRPr>
+          </a:p>
+        </p:txBody>
+      </p:sp>
+      <p:sp>
+        <p:nvSpPr>
+          <p:cNvPr id="18" name="Rectangular Callout 17"/>
+          <p:cNvSpPr/>
+          <p:nvPr/>
+        </p:nvSpPr>
+        <p:spPr>
+          <a:xfrm>
+            <a:off x="4572000" y="4191000"/>
+            <a:ext cx="2133600" cy="381000"/>
+          </a:xfrm>
+          <a:prstGeom prst="wedgeRectCallout">
+            <a:avLst>
+              <a:gd name="adj1" fmla="val -18308"/>
+              <a:gd name="adj2" fmla="val -77976"/>
+            </a:avLst>
+          </a:prstGeom>
+          <a:noFill/>
+          <a:ln>
+            <a:solidFill>
+              <a:schemeClr val="tx2">
+                <a:lumMod val="60000"/>
+                <a:lumOff val="40000"/>
+              </a:schemeClr>
+            </a:solidFill>
+          </a:ln>
+        </p:spPr>
+        <p:style>
+          <a:lnRef idx="2">
+            <a:schemeClr val="accent1">
+              <a:shade val="50000"/>
+            </a:schemeClr>
+          </a:lnRef>
+          <a:fillRef idx="1">
+            <a:schemeClr val="accent1"/>
+          </a:fillRef>
+          <a:effectRef idx="0">
+            <a:schemeClr val="accent1"/>
+          </a:effectRef>
+          <a:fontRef idx="minor">
+            <a:schemeClr val="lt1"/>
+          </a:fontRef>
+        </p:style>
+        <p:txBody>
+          <a:bodyPr rtlCol="0" anchor="ctr"/>
+          <a:lstStyle/>
+          <a:p>
+            <a:pPr algn="ctr"/>
+            <a:r>
+              <a:rPr lang="nl-NL" dirty="0" smtClean="0">
+                <a:solidFill>
+                  <a:schemeClr val="tx2">
+                    <a:lumMod val="60000"/>
+                    <a:lumOff val="40000"/>
+                  </a:schemeClr>
+                </a:solidFill>
+              </a:rPr>
+              <a:t>Marginal probability</a:t>
+            </a:r>
+            <a:endParaRPr lang="en-GB" dirty="0">
+              <a:solidFill>
+                <a:schemeClr val="tx2">
+                  <a:lumMod val="60000"/>
+                  <a:lumOff val="40000"/>
+                </a:schemeClr>
+              </a:solidFill>
+            </a:endParaRPr>
+          </a:p>
+        </p:txBody>
+      </p:sp>
+      <p:sp>
+        <p:nvSpPr>
+          <p:cNvPr id="19" name="Rectangular Callout 18"/>
+          <p:cNvSpPr/>
+          <p:nvPr/>
+        </p:nvSpPr>
+        <p:spPr>
+          <a:xfrm>
+            <a:off x="1676400" y="3048000"/>
+            <a:ext cx="1066800" cy="533400"/>
+          </a:xfrm>
+          <a:prstGeom prst="wedgeRectCallout">
+            <a:avLst>
+              <a:gd name="adj1" fmla="val -20833"/>
+              <a:gd name="adj2" fmla="val 67262"/>
+            </a:avLst>
+          </a:prstGeom>
+          <a:noFill/>
+        </p:spPr>
+        <p:style>
+          <a:lnRef idx="2">
+            <a:schemeClr val="accent1">
+              <a:shade val="50000"/>
+            </a:schemeClr>
+          </a:lnRef>
+          <a:fillRef idx="1">
+            <a:schemeClr val="accent1"/>
+          </a:fillRef>
+          <a:effectRef idx="0">
+            <a:schemeClr val="accent1"/>
+          </a:effectRef>
+          <a:fontRef idx="minor">
+            <a:schemeClr val="lt1"/>
+          </a:fontRef>
+        </p:style>
+        <p:txBody>
+          <a:bodyPr rtlCol="0" anchor="ctr"/>
+          <a:lstStyle/>
+          <a:p>
+            <a:pPr algn="ctr"/>
+            <a:r>
+              <a:rPr lang="nl-NL" dirty="0" smtClean="0">
+                <a:solidFill>
+                  <a:schemeClr val="tx2">
+                    <a:lumMod val="75000"/>
+                  </a:schemeClr>
+                </a:solidFill>
+              </a:rPr>
+              <a:t>Posterior</a:t>
+            </a:r>
+            <a:endParaRPr lang="en-GB" dirty="0">
+              <a:solidFill>
+                <a:schemeClr val="tx2">
+                  <a:lumMod val="75000"/>
+                </a:schemeClr>
+              </a:solidFill>
+            </a:endParaRPr>
+          </a:p>
+        </p:txBody>
+      </p:sp>
+    </p:spTree>
+  </p:cSld>
+  <p:clrMapOvr>
+    <a:masterClrMapping/>
+  </p:clrMapOvr>
+  <p:timing>
+    <p:tnLst>
+      <p:par>
+        <p:cTn id="1" dur="indefinite" restart="never" nodeType="tmRoot"/>
+      </p:par>
+    </p:tnLst>
+  </p:timing>
+</p:sld>
+</file>
+
+<file path=ppt/slides/slide19.xml><?xml version="1.0" encoding="utf-8"?>
 <p:sld xmlns:a="http://schemas.openxmlformats.org/drawingml/2006/main" xmlns:r="http://schemas.openxmlformats.org/officeDocument/2006/relationships" xmlns:p="http://schemas.openxmlformats.org/presentationml/2006/main">
   <p:cSld>
     <p:spTree>
@@ -6342,7 +7150,186 @@
 </p:sld>
 </file>
 
-<file path=ppt/slides/slide16.xml><?xml version="1.0" encoding="utf-8"?>
+<file path=ppt/slides/slide2.xml><?xml version="1.0" encoding="utf-8"?>
+<p:sld xmlns:a="http://schemas.openxmlformats.org/drawingml/2006/main" xmlns:r="http://schemas.openxmlformats.org/officeDocument/2006/relationships" xmlns:p="http://schemas.openxmlformats.org/presentationml/2006/main">
+  <p:cSld>
+    <p:spTree>
+      <p:nvGrpSpPr>
+        <p:cNvPr id="1" name=""/>
+        <p:cNvGrpSpPr/>
+        <p:nvPr/>
+      </p:nvGrpSpPr>
+      <p:grpSpPr>
+        <a:xfrm>
+          <a:off x="0" y="0"/>
+          <a:ext cx="0" cy="0"/>
+          <a:chOff x="0" y="0"/>
+          <a:chExt cx="0" cy="0"/>
+        </a:xfrm>
+      </p:grpSpPr>
+      <p:pic>
+        <p:nvPicPr>
+          <p:cNvPr id="2050" name="Picture 2" descr="C:\Users\Aline\Downloads\background_40393663_468_2.jpg"/>
+          <p:cNvPicPr>
+            <a:picLocks noChangeAspect="1" noChangeArrowheads="1"/>
+          </p:cNvPicPr>
+          <p:nvPr/>
+        </p:nvPicPr>
+        <p:blipFill>
+          <a:blip r:embed="rId3" cstate="print"/>
+          <a:srcRect/>
+          <a:stretch>
+            <a:fillRect/>
+          </a:stretch>
+        </p:blipFill>
+        <p:spPr bwMode="auto">
+          <a:xfrm>
+            <a:off x="-13063" y="0"/>
+            <a:ext cx="9170126" cy="6858000"/>
+          </a:xfrm>
+          <a:prstGeom prst="rect">
+            <a:avLst/>
+          </a:prstGeom>
+          <a:noFill/>
+        </p:spPr>
+      </p:pic>
+      <p:pic>
+        <p:nvPicPr>
+          <p:cNvPr id="7" name="Picture 3" descr="C:\Users\Aline\Downloads\il_570xN.450080809_qa36.jpg"/>
+          <p:cNvPicPr>
+            <a:picLocks noChangeAspect="1" noChangeArrowheads="1"/>
+          </p:cNvPicPr>
+          <p:nvPr/>
+        </p:nvPicPr>
+        <p:blipFill>
+          <a:blip r:embed="rId4" cstate="print">
+            <a:lum bright="60000"/>
+          </a:blip>
+          <a:srcRect/>
+          <a:stretch>
+            <a:fillRect/>
+          </a:stretch>
+        </p:blipFill>
+        <p:spPr bwMode="auto">
+          <a:xfrm>
+            <a:off x="3505200" y="3505200"/>
+            <a:ext cx="2057400" cy="2057400"/>
+          </a:xfrm>
+          <a:prstGeom prst="rect">
+            <a:avLst/>
+          </a:prstGeom>
+          <a:noFill/>
+        </p:spPr>
+      </p:pic>
+      <p:sp>
+        <p:nvSpPr>
+          <p:cNvPr id="2" name="Title 1"/>
+          <p:cNvSpPr>
+            <a:spLocks noGrp="1"/>
+          </p:cNvSpPr>
+          <p:nvPr>
+            <p:ph type="title"/>
+          </p:nvPr>
+        </p:nvSpPr>
+        <p:spPr/>
+        <p:txBody>
+          <a:bodyPr/>
+          <a:lstStyle/>
+          <a:p>
+            <a:r>
+              <a:rPr lang="en-GB" b="1" dirty="0" smtClean="0"/>
+              <a:t>Research Question</a:t>
+            </a:r>
+            <a:endParaRPr lang="en-GB" b="1" dirty="0"/>
+          </a:p>
+        </p:txBody>
+      </p:sp>
+      <p:sp>
+        <p:nvSpPr>
+          <p:cNvPr id="3" name="Content Placeholder 2"/>
+          <p:cNvSpPr>
+            <a:spLocks noGrp="1"/>
+          </p:cNvSpPr>
+          <p:nvPr>
+            <p:ph idx="1"/>
+          </p:nvPr>
+        </p:nvSpPr>
+        <p:spPr>
+          <a:xfrm>
+            <a:off x="0" y="2209800"/>
+            <a:ext cx="9144000" cy="2133600"/>
+          </a:xfrm>
+        </p:spPr>
+        <p:txBody>
+          <a:bodyPr>
+            <a:noAutofit/>
+          </a:bodyPr>
+          <a:lstStyle/>
+          <a:p>
+            <a:pPr algn="ctr">
+              <a:buNone/>
+            </a:pPr>
+            <a:r>
+              <a:rPr lang="en-GB" dirty="0" smtClean="0"/>
+              <a:t>If speciation in nature takes </a:t>
+            </a:r>
+            <a:r>
+              <a:rPr lang="en-GB" b="1" dirty="0" smtClean="0"/>
+              <a:t>time</a:t>
+            </a:r>
+            <a:r>
+              <a:rPr lang="en-GB" dirty="0" smtClean="0"/>
+              <a:t>, </a:t>
+            </a:r>
+          </a:p>
+          <a:p>
+            <a:pPr algn="ctr">
+              <a:buNone/>
+            </a:pPr>
+            <a:r>
+              <a:rPr lang="en-GB" dirty="0" smtClean="0"/>
+              <a:t>what is the </a:t>
+            </a:r>
+            <a:r>
+              <a:rPr lang="en-GB" b="1" dirty="0" smtClean="0"/>
+              <a:t>error</a:t>
+            </a:r>
+            <a:r>
+              <a:rPr lang="en-GB" dirty="0" smtClean="0"/>
+              <a:t> BEAST2 makes in inferring a phylogeny?</a:t>
+            </a:r>
+            <a:endParaRPr lang="nl-NL" dirty="0" smtClean="0"/>
+          </a:p>
+          <a:p>
+            <a:pPr>
+              <a:buNone/>
+            </a:pPr>
+            <a:endParaRPr lang="nl-NL" sz="2400" dirty="0" smtClean="0"/>
+          </a:p>
+          <a:p>
+            <a:pPr>
+              <a:buNone/>
+            </a:pPr>
+            <a:endParaRPr lang="en-GB" sz="2000" dirty="0"/>
+          </a:p>
+        </p:txBody>
+      </p:sp>
+    </p:spTree>
+  </p:cSld>
+  <p:clrMapOvr>
+    <a:masterClrMapping/>
+  </p:clrMapOvr>
+  <p:timing>
+    <p:tnLst>
+      <p:par>
+        <p:cTn id="1" dur="indefinite" restart="never" nodeType="tmRoot"/>
+      </p:par>
+    </p:tnLst>
+  </p:timing>
+</p:sld>
+</file>
+
+<file path=ppt/slides/slide20.xml><?xml version="1.0" encoding="utf-8"?>
 <p:sld xmlns:a="http://schemas.openxmlformats.org/drawingml/2006/main" xmlns:r="http://schemas.openxmlformats.org/officeDocument/2006/relationships" xmlns:p="http://schemas.openxmlformats.org/presentationml/2006/main">
   <p:cSld>
     <p:spTree>
@@ -6934,7 +7921,7 @@
 </p:sld>
 </file>
 
-<file path=ppt/slides/slide17.xml><?xml version="1.0" encoding="utf-8"?>
+<file path=ppt/slides/slide21.xml><?xml version="1.0" encoding="utf-8"?>
 <p:sld xmlns:a="http://schemas.openxmlformats.org/drawingml/2006/main" xmlns:r="http://schemas.openxmlformats.org/officeDocument/2006/relationships" xmlns:p="http://schemas.openxmlformats.org/presentationml/2006/main">
   <p:cSld>
     <p:spTree>
@@ -7309,7 +8296,7 @@
 </p:sld>
 </file>
 
-<file path=ppt/slides/slide18.xml><?xml version="1.0" encoding="utf-8"?>
+<file path=ppt/slides/slide22.xml><?xml version="1.0" encoding="utf-8"?>
 <p:sld xmlns:a="http://schemas.openxmlformats.org/drawingml/2006/main" xmlns:r="http://schemas.openxmlformats.org/officeDocument/2006/relationships" xmlns:p="http://schemas.openxmlformats.org/presentationml/2006/main">
   <p:cSld>
     <p:spTree>
@@ -7631,7 +8618,7 @@
 </p:sld>
 </file>
 
-<file path=ppt/slides/slide19.xml><?xml version="1.0" encoding="utf-8"?>
+<file path=ppt/slides/slide23.xml><?xml version="1.0" encoding="utf-8"?>
 <p:sld xmlns:a="http://schemas.openxmlformats.org/drawingml/2006/main" xmlns:r="http://schemas.openxmlformats.org/officeDocument/2006/relationships" xmlns:p="http://schemas.openxmlformats.org/presentationml/2006/main">
   <p:cSld>
     <p:spTree>
@@ -7946,185 +8933,6 @@
 </p:sld>
 </file>
 
-<file path=ppt/slides/slide2.xml><?xml version="1.0" encoding="utf-8"?>
-<p:sld xmlns:a="http://schemas.openxmlformats.org/drawingml/2006/main" xmlns:r="http://schemas.openxmlformats.org/officeDocument/2006/relationships" xmlns:p="http://schemas.openxmlformats.org/presentationml/2006/main">
-  <p:cSld>
-    <p:spTree>
-      <p:nvGrpSpPr>
-        <p:cNvPr id="1" name=""/>
-        <p:cNvGrpSpPr/>
-        <p:nvPr/>
-      </p:nvGrpSpPr>
-      <p:grpSpPr>
-        <a:xfrm>
-          <a:off x="0" y="0"/>
-          <a:ext cx="0" cy="0"/>
-          <a:chOff x="0" y="0"/>
-          <a:chExt cx="0" cy="0"/>
-        </a:xfrm>
-      </p:grpSpPr>
-      <p:pic>
-        <p:nvPicPr>
-          <p:cNvPr id="2050" name="Picture 2" descr="C:\Users\Aline\Downloads\background_40393663_468_2.jpg"/>
-          <p:cNvPicPr>
-            <a:picLocks noChangeAspect="1" noChangeArrowheads="1"/>
-          </p:cNvPicPr>
-          <p:nvPr/>
-        </p:nvPicPr>
-        <p:blipFill>
-          <a:blip r:embed="rId3" cstate="print"/>
-          <a:srcRect/>
-          <a:stretch>
-            <a:fillRect/>
-          </a:stretch>
-        </p:blipFill>
-        <p:spPr bwMode="auto">
-          <a:xfrm>
-            <a:off x="-13063" y="0"/>
-            <a:ext cx="9170126" cy="6858000"/>
-          </a:xfrm>
-          <a:prstGeom prst="rect">
-            <a:avLst/>
-          </a:prstGeom>
-          <a:noFill/>
-        </p:spPr>
-      </p:pic>
-      <p:pic>
-        <p:nvPicPr>
-          <p:cNvPr id="7" name="Picture 3" descr="C:\Users\Aline\Downloads\il_570xN.450080809_qa36.jpg"/>
-          <p:cNvPicPr>
-            <a:picLocks noChangeAspect="1" noChangeArrowheads="1"/>
-          </p:cNvPicPr>
-          <p:nvPr/>
-        </p:nvPicPr>
-        <p:blipFill>
-          <a:blip r:embed="rId4" cstate="print">
-            <a:lum bright="50000"/>
-          </a:blip>
-          <a:srcRect/>
-          <a:stretch>
-            <a:fillRect/>
-          </a:stretch>
-        </p:blipFill>
-        <p:spPr bwMode="auto">
-          <a:xfrm>
-            <a:off x="3505200" y="3505200"/>
-            <a:ext cx="2057400" cy="2057400"/>
-          </a:xfrm>
-          <a:prstGeom prst="rect">
-            <a:avLst/>
-          </a:prstGeom>
-          <a:noFill/>
-        </p:spPr>
-      </p:pic>
-      <p:sp>
-        <p:nvSpPr>
-          <p:cNvPr id="2" name="Title 1"/>
-          <p:cNvSpPr>
-            <a:spLocks noGrp="1"/>
-          </p:cNvSpPr>
-          <p:nvPr>
-            <p:ph type="title"/>
-          </p:nvPr>
-        </p:nvSpPr>
-        <p:spPr/>
-        <p:txBody>
-          <a:bodyPr/>
-          <a:lstStyle/>
-          <a:p>
-            <a:r>
-              <a:rPr lang="en-GB" b="1" dirty="0" smtClean="0"/>
-              <a:t>Research Question</a:t>
-            </a:r>
-            <a:endParaRPr lang="en-GB" b="1" dirty="0"/>
-          </a:p>
-        </p:txBody>
-      </p:sp>
-      <p:sp>
-        <p:nvSpPr>
-          <p:cNvPr id="3" name="Content Placeholder 2"/>
-          <p:cNvSpPr>
-            <a:spLocks noGrp="1"/>
-          </p:cNvSpPr>
-          <p:nvPr>
-            <p:ph idx="1"/>
-          </p:nvPr>
-        </p:nvSpPr>
-        <p:spPr>
-          <a:xfrm>
-            <a:off x="0" y="2209800"/>
-            <a:ext cx="9144000" cy="2133600"/>
-          </a:xfrm>
-        </p:spPr>
-        <p:txBody>
-          <a:bodyPr>
-            <a:noAutofit/>
-          </a:bodyPr>
-          <a:lstStyle/>
-          <a:p>
-            <a:pPr algn="ctr">
-              <a:buNone/>
-            </a:pPr>
-            <a:r>
-              <a:rPr lang="en-GB" dirty="0" smtClean="0"/>
-              <a:t>If speciation in nature takes </a:t>
-            </a:r>
-            <a:r>
-              <a:rPr lang="en-GB" b="1" dirty="0" smtClean="0"/>
-              <a:t>time</a:t>
-            </a:r>
-            <a:r>
-              <a:rPr lang="en-GB" dirty="0" smtClean="0"/>
-              <a:t>, </a:t>
-            </a:r>
-          </a:p>
-          <a:p>
-            <a:pPr algn="ctr">
-              <a:buNone/>
-            </a:pPr>
-            <a:r>
-              <a:rPr lang="en-GB" dirty="0" smtClean="0"/>
-              <a:t>what is the </a:t>
-            </a:r>
-            <a:r>
-              <a:rPr lang="en-GB" b="1" dirty="0" smtClean="0"/>
-              <a:t>error</a:t>
-            </a:r>
-            <a:r>
-              <a:rPr lang="en-GB" dirty="0" smtClean="0"/>
-              <a:t> BEAST2 makes in inferring a phylogeny?</a:t>
-            </a:r>
-            <a:endParaRPr lang="nl-NL" dirty="0" smtClean="0"/>
-          </a:p>
-          <a:p>
-            <a:pPr>
-              <a:buNone/>
-            </a:pPr>
-            <a:endParaRPr lang="nl-NL" sz="2400" dirty="0" smtClean="0"/>
-          </a:p>
-          <a:p>
-            <a:pPr>
-              <a:buNone/>
-            </a:pPr>
-            <a:endParaRPr lang="en-GB" sz="2000" dirty="0"/>
-          </a:p>
-        </p:txBody>
-      </p:sp>
-    </p:spTree>
-  </p:cSld>
-  <p:clrMapOvr>
-    <a:masterClrMapping/>
-  </p:clrMapOvr>
-  <p:timing>
-    <p:tnLst>
-      <p:par>
-        <p:cTn id="1" dur="indefinite" restart="never" nodeType="tmRoot"/>
-      </p:par>
-    </p:tnLst>
-  </p:timing>
-</p:sld>
-</file>
-
 <file path=ppt/slides/slide3.xml><?xml version="1.0" encoding="utf-8"?>
 <p:sld xmlns:a="http://schemas.openxmlformats.org/drawingml/2006/main" xmlns:r="http://schemas.openxmlformats.org/officeDocument/2006/relationships" xmlns:p="http://schemas.openxmlformats.org/presentationml/2006/main">
   <p:cSld>
@@ -8248,7 +9056,6 @@
               <a:rPr lang="en-GB" sz="2800" b="1" dirty="0" smtClean="0"/>
               <a:t>Speciation</a:t>
             </a:r>
-            <a:endParaRPr lang="en-GB" sz="2800" b="1" dirty="0" smtClean="0"/>
           </a:p>
           <a:p>
             <a:pPr lvl="1"/>
@@ -8962,7 +9769,7 @@
           <p:nvPr/>
         </p:nvPicPr>
         <p:blipFill>
-          <a:blip r:embed="rId2" cstate="print"/>
+          <a:blip r:embed="rId3" cstate="print"/>
           <a:srcRect/>
           <a:stretch>
             <a:fillRect/>
@@ -9037,8 +9844,9 @@
             <a:pPr lvl="1"/>
             <a:r>
               <a:rPr lang="en-GB" sz="2400" dirty="0" smtClean="0"/>
-              <a:t>Simple artefact </a:t>
-            </a:r>
+              <a:t>Sampling artefact </a:t>
+            </a:r>
+            <a:endParaRPr lang="en-GB" sz="2400" dirty="0" smtClean="0"/>
           </a:p>
           <a:p>
             <a:pPr lvl="1"/>
@@ -9058,8 +9866,8 @@
           <p:nvPr/>
         </p:nvPicPr>
         <p:blipFill>
-          <a:blip r:embed="rId3" cstate="print">
-            <a:lum bright="50000"/>
+          <a:blip r:embed="rId4" cstate="print">
+            <a:lum bright="60000"/>
           </a:blip>
           <a:srcRect/>
           <a:stretch>
@@ -9536,14 +10344,16 @@
       </p:pic>
       <p:pic>
         <p:nvPicPr>
-          <p:cNvPr id="6153" name="Picture 9" descr="C:\Users\Aline\Dropbox\RUG 2015-2016\Posterior.png"/>
+          <p:cNvPr id="1029" name="Picture 5" descr="C:\Users\Aline\Dropbox\RUG 2015-2016\1.9 Community eclogy research\4. Poster_presentation\Figs and graphs ppt\Step4_Posterior.png"/>
           <p:cNvPicPr>
             <a:picLocks noChangeAspect="1" noChangeArrowheads="1"/>
           </p:cNvPicPr>
           <p:nvPr/>
         </p:nvPicPr>
         <p:blipFill>
-          <a:blip r:embed="rId3" cstate="print"/>
+          <a:blip r:embed="rId3" cstate="print">
+            <a:lum bright="-50000" contrast="70000"/>
+          </a:blip>
           <a:srcRect/>
           <a:stretch>
             <a:fillRect/>
@@ -9551,8 +10361,34 @@
         </p:blipFill>
         <p:spPr bwMode="auto">
           <a:xfrm>
-            <a:off x="5486400" y="762000"/>
-            <a:ext cx="2971800" cy="2971800"/>
+            <a:off x="5029200" y="381000"/>
+            <a:ext cx="3506787" cy="3506787"/>
+          </a:xfrm>
+          <a:prstGeom prst="rect">
+            <a:avLst/>
+          </a:prstGeom>
+          <a:noFill/>
+        </p:spPr>
+      </p:pic>
+      <p:pic>
+        <p:nvPicPr>
+          <p:cNvPr id="1028" name="Picture 4" descr="C:\Users\Aline\Dropbox\RUG 2015-2016\1.9 Community eclogy research\4. Poster_presentation\Figs and graphs ppt\Step3_Alignment.png"/>
+          <p:cNvPicPr>
+            <a:picLocks noChangeAspect="1" noChangeArrowheads="1"/>
+          </p:cNvPicPr>
+          <p:nvPr/>
+        </p:nvPicPr>
+        <p:blipFill>
+          <a:blip r:embed="rId4" cstate="print"/>
+          <a:srcRect/>
+          <a:stretch>
+            <a:fillRect/>
+          </a:stretch>
+        </p:blipFill>
+        <p:spPr bwMode="auto">
+          <a:xfrm>
+            <a:off x="5638800" y="4419600"/>
+            <a:ext cx="2514600" cy="1860136"/>
           </a:xfrm>
           <a:prstGeom prst="rect">
             <a:avLst/>
@@ -9815,33 +10651,7 @@
       </p:sp>
       <p:pic>
         <p:nvPicPr>
-          <p:cNvPr id="6146" name="Picture 2" descr="C:\Users\Aline\Dropbox\RUG 2015-2016\Incipient.png"/>
-          <p:cNvPicPr>
-            <a:picLocks noChangeAspect="1" noChangeArrowheads="1"/>
-          </p:cNvPicPr>
-          <p:nvPr/>
-        </p:nvPicPr>
-        <p:blipFill>
-          <a:blip r:embed="rId4" cstate="print"/>
-          <a:srcRect/>
-          <a:stretch>
-            <a:fillRect/>
-          </a:stretch>
-        </p:blipFill>
-        <p:spPr bwMode="auto">
-          <a:xfrm>
-            <a:off x="381000" y="1524000"/>
-            <a:ext cx="3422628" cy="1881188"/>
-          </a:xfrm>
-          <a:prstGeom prst="rect">
-            <a:avLst/>
-          </a:prstGeom>
-          <a:noFill/>
-        </p:spPr>
-      </p:pic>
-      <p:pic>
-        <p:nvPicPr>
-          <p:cNvPr id="6149" name="Picture 5" descr="C:\Users\Aline\Dropbox\RUG 2015-2016\Species tree.png"/>
+          <p:cNvPr id="21" name="Picture 5" descr="beast.png"/>
           <p:cNvPicPr>
             <a:picLocks noChangeAspect="1" noChangeArrowheads="1"/>
           </p:cNvPicPr>
@@ -9855,61 +10665,9 @@
           </a:stretch>
         </p:blipFill>
         <p:spPr bwMode="auto">
-          <a:xfrm>
-            <a:off x="1143000" y="4495800"/>
-            <a:ext cx="1981200" cy="1558643"/>
-          </a:xfrm>
-          <a:prstGeom prst="rect">
-            <a:avLst/>
-          </a:prstGeom>
-          <a:noFill/>
-        </p:spPr>
-      </p:pic>
-      <p:pic>
-        <p:nvPicPr>
-          <p:cNvPr id="6152" name="Picture 8" descr="C:\Users\Aline\Dropbox\RUG 2015-2016\Alignment.png"/>
-          <p:cNvPicPr>
-            <a:picLocks noChangeAspect="1" noChangeArrowheads="1"/>
-          </p:cNvPicPr>
-          <p:nvPr/>
-        </p:nvPicPr>
-        <p:blipFill>
-          <a:blip r:embed="rId6" cstate="print"/>
-          <a:srcRect/>
-          <a:stretch>
-            <a:fillRect/>
-          </a:stretch>
-        </p:blipFill>
-        <p:spPr bwMode="auto">
-          <a:xfrm>
-            <a:off x="5715001" y="4518431"/>
-            <a:ext cx="2590800" cy="1645832"/>
-          </a:xfrm>
-          <a:prstGeom prst="rect">
-            <a:avLst/>
-          </a:prstGeom>
-          <a:noFill/>
-        </p:spPr>
-      </p:pic>
-      <p:pic>
-        <p:nvPicPr>
-          <p:cNvPr id="21" name="Picture 5" descr="beast.png"/>
-          <p:cNvPicPr>
-            <a:picLocks noChangeAspect="1" noChangeArrowheads="1"/>
-          </p:cNvPicPr>
-          <p:nvPr/>
-        </p:nvPicPr>
-        <p:blipFill>
-          <a:blip r:embed="rId7" cstate="print"/>
-          <a:srcRect/>
-          <a:stretch>
-            <a:fillRect/>
-          </a:stretch>
-        </p:blipFill>
-        <p:spPr bwMode="auto">
-          <a:xfrm>
-            <a:off x="4038600" y="4343400"/>
-            <a:ext cx="914400" cy="914401"/>
+          <a:xfrm rot="20432816">
+            <a:off x="5962023" y="3904623"/>
+            <a:ext cx="685800" cy="685801"/>
           </a:xfrm>
           <a:prstGeom prst="rect">
             <a:avLst/>
@@ -10083,6 +10841,58 @@
           </a:p>
         </p:txBody>
       </p:sp>
+      <p:pic>
+        <p:nvPicPr>
+          <p:cNvPr id="1026" name="Picture 2" descr="C:\Users\Aline\Dropbox\RUG 2015-2016\1.9 Community eclogy research\4. Poster_presentation\Figs and graphs ppt\Step1_Incipient species tree.png"/>
+          <p:cNvPicPr>
+            <a:picLocks noChangeAspect="1" noChangeArrowheads="1"/>
+          </p:cNvPicPr>
+          <p:nvPr/>
+        </p:nvPicPr>
+        <p:blipFill>
+          <a:blip r:embed="rId6" cstate="print"/>
+          <a:srcRect/>
+          <a:stretch>
+            <a:fillRect/>
+          </a:stretch>
+        </p:blipFill>
+        <p:spPr bwMode="auto">
+          <a:xfrm>
+            <a:off x="1066800" y="1295400"/>
+            <a:ext cx="2286000" cy="2286000"/>
+          </a:xfrm>
+          <a:prstGeom prst="rect">
+            <a:avLst/>
+          </a:prstGeom>
+          <a:noFill/>
+        </p:spPr>
+      </p:pic>
+      <p:pic>
+        <p:nvPicPr>
+          <p:cNvPr id="1027" name="Picture 3" descr="C:\Users\Aline\Dropbox\RUG 2015-2016\1.9 Community eclogy research\4. Poster_presentation\Figs and graphs ppt\Step2_Sampled species tree.png"/>
+          <p:cNvPicPr>
+            <a:picLocks noChangeAspect="1" noChangeArrowheads="1"/>
+          </p:cNvPicPr>
+          <p:nvPr/>
+        </p:nvPicPr>
+        <p:blipFill>
+          <a:blip r:embed="rId7" cstate="print"/>
+          <a:srcRect/>
+          <a:stretch>
+            <a:fillRect/>
+          </a:stretch>
+        </p:blipFill>
+        <p:spPr bwMode="auto">
+          <a:xfrm>
+            <a:off x="1219200" y="4724400"/>
+            <a:ext cx="1847850" cy="1295400"/>
+          </a:xfrm>
+          <a:prstGeom prst="rect">
+            <a:avLst/>
+          </a:prstGeom>
+          <a:noFill/>
+        </p:spPr>
+      </p:pic>
     </p:spTree>
   </p:cSld>
   <p:clrMapOvr>
@@ -10091,368 +10901,9 @@
   <p:timing>
     <p:tnLst>
       <p:par>
-        <p:cTn id="1" dur="indefinite" restart="never" nodeType="tmRoot">
-          <p:childTnLst>
-            <p:seq concurrent="1" nextAc="seek">
-              <p:cTn id="2" dur="indefinite" nodeType="mainSeq">
-                <p:childTnLst>
-                  <p:par>
-                    <p:cTn id="3" fill="hold">
-                      <p:stCondLst>
-                        <p:cond delay="indefinite"/>
-                        <p:cond evt="onBegin" delay="0">
-                          <p:tn val="2"/>
-                        </p:cond>
-                      </p:stCondLst>
-                      <p:childTnLst>
-                        <p:par>
-                          <p:cTn id="4" fill="hold">
-                            <p:stCondLst>
-                              <p:cond delay="0"/>
-                            </p:stCondLst>
-                            <p:childTnLst>
-                              <p:par>
-                                <p:cTn id="5" presetID="1" presetClass="entr" presetSubtype="0" fill="hold" grpId="0" nodeType="withEffect">
-                                  <p:stCondLst>
-                                    <p:cond delay="0"/>
-                                  </p:stCondLst>
-                                  <p:childTnLst>
-                                    <p:set>
-                                      <p:cBhvr>
-                                        <p:cTn id="6" dur="1" fill="hold">
-                                          <p:stCondLst>
-                                            <p:cond delay="0"/>
-                                          </p:stCondLst>
-                                        </p:cTn>
-                                        <p:tgtEl>
-                                          <p:spTgt spid="10"/>
-                                        </p:tgtEl>
-                                        <p:attrNameLst>
-                                          <p:attrName>style.visibility</p:attrName>
-                                        </p:attrNameLst>
-                                      </p:cBhvr>
-                                      <p:to>
-                                        <p:strVal val="visible"/>
-                                      </p:to>
-                                    </p:set>
-                                  </p:childTnLst>
-                                </p:cTn>
-                              </p:par>
-                            </p:childTnLst>
-                          </p:cTn>
-                        </p:par>
-                      </p:childTnLst>
-                    </p:cTn>
-                  </p:par>
-                  <p:par>
-                    <p:cTn id="7" fill="hold">
-                      <p:stCondLst>
-                        <p:cond delay="indefinite"/>
-                      </p:stCondLst>
-                      <p:childTnLst>
-                        <p:par>
-                          <p:cTn id="8" fill="hold">
-                            <p:stCondLst>
-                              <p:cond delay="0"/>
-                            </p:stCondLst>
-                            <p:childTnLst>
-                              <p:par>
-                                <p:cTn id="9" presetID="1" presetClass="entr" presetSubtype="0" fill="hold" grpId="0" nodeType="clickEffect">
-                                  <p:stCondLst>
-                                    <p:cond delay="0"/>
-                                  </p:stCondLst>
-                                  <p:childTnLst>
-                                    <p:set>
-                                      <p:cBhvr>
-                                        <p:cTn id="10" dur="1" fill="hold">
-                                          <p:stCondLst>
-                                            <p:cond delay="0"/>
-                                          </p:stCondLst>
-                                        </p:cTn>
-                                        <p:tgtEl>
-                                          <p:spTgt spid="12"/>
-                                        </p:tgtEl>
-                                        <p:attrNameLst>
-                                          <p:attrName>style.visibility</p:attrName>
-                                        </p:attrNameLst>
-                                      </p:cBhvr>
-                                      <p:to>
-                                        <p:strVal val="visible"/>
-                                      </p:to>
-                                    </p:set>
-                                  </p:childTnLst>
-                                </p:cTn>
-                              </p:par>
-                            </p:childTnLst>
-                          </p:cTn>
-                        </p:par>
-                      </p:childTnLst>
-                    </p:cTn>
-                  </p:par>
-                  <p:par>
-                    <p:cTn id="11" fill="hold">
-                      <p:stCondLst>
-                        <p:cond delay="indefinite"/>
-                      </p:stCondLst>
-                      <p:childTnLst>
-                        <p:par>
-                          <p:cTn id="12" fill="hold">
-                            <p:stCondLst>
-                              <p:cond delay="0"/>
-                            </p:stCondLst>
-                            <p:childTnLst>
-                              <p:par>
-                                <p:cTn id="13" presetID="1" presetClass="entr" presetSubtype="0" fill="hold" grpId="0" nodeType="clickEffect">
-                                  <p:stCondLst>
-                                    <p:cond delay="0"/>
-                                  </p:stCondLst>
-                                  <p:childTnLst>
-                                    <p:set>
-                                      <p:cBhvr>
-                                        <p:cTn id="14" dur="1" fill="hold">
-                                          <p:stCondLst>
-                                            <p:cond delay="0"/>
-                                          </p:stCondLst>
-                                        </p:cTn>
-                                        <p:tgtEl>
-                                          <p:spTgt spid="11"/>
-                                        </p:tgtEl>
-                                        <p:attrNameLst>
-                                          <p:attrName>style.visibility</p:attrName>
-                                        </p:attrNameLst>
-                                      </p:cBhvr>
-                                      <p:to>
-                                        <p:strVal val="visible"/>
-                                      </p:to>
-                                    </p:set>
-                                  </p:childTnLst>
-                                </p:cTn>
-                              </p:par>
-                            </p:childTnLst>
-                          </p:cTn>
-                        </p:par>
-                      </p:childTnLst>
-                    </p:cTn>
-                  </p:par>
-                  <p:par>
-                    <p:cTn id="15" fill="hold">
-                      <p:stCondLst>
-                        <p:cond delay="indefinite"/>
-                      </p:stCondLst>
-                      <p:childTnLst>
-                        <p:par>
-                          <p:cTn id="16" fill="hold">
-                            <p:stCondLst>
-                              <p:cond delay="0"/>
-                            </p:stCondLst>
-                            <p:childTnLst>
-                              <p:par>
-                                <p:cTn id="17" presetID="1" presetClass="entr" presetSubtype="0" fill="hold" nodeType="clickEffect">
-                                  <p:stCondLst>
-                                    <p:cond delay="0"/>
-                                  </p:stCondLst>
-                                  <p:childTnLst>
-                                    <p:set>
-                                      <p:cBhvr>
-                                        <p:cTn id="18" dur="1" fill="hold">
-                                          <p:stCondLst>
-                                            <p:cond delay="0"/>
-                                          </p:stCondLst>
-                                        </p:cTn>
-                                        <p:tgtEl>
-                                          <p:spTgt spid="21"/>
-                                        </p:tgtEl>
-                                        <p:attrNameLst>
-                                          <p:attrName>style.visibility</p:attrName>
-                                        </p:attrNameLst>
-                                      </p:cBhvr>
-                                      <p:to>
-                                        <p:strVal val="visible"/>
-                                      </p:to>
-                                    </p:set>
-                                  </p:childTnLst>
-                                </p:cTn>
-                              </p:par>
-                              <p:par>
-                                <p:cTn id="19" presetID="1" presetClass="entr" presetSubtype="0" fill="hold" grpId="0" nodeType="withEffect">
-                                  <p:stCondLst>
-                                    <p:cond delay="0"/>
-                                  </p:stCondLst>
-                                  <p:childTnLst>
-                                    <p:set>
-                                      <p:cBhvr>
-                                        <p:cTn id="20" dur="1" fill="hold">
-                                          <p:stCondLst>
-                                            <p:cond delay="0"/>
-                                          </p:stCondLst>
-                                        </p:cTn>
-                                        <p:tgtEl>
-                                          <p:spTgt spid="23"/>
-                                        </p:tgtEl>
-                                        <p:attrNameLst>
-                                          <p:attrName>style.visibility</p:attrName>
-                                        </p:attrNameLst>
-                                      </p:cBhvr>
-                                      <p:to>
-                                        <p:strVal val="visible"/>
-                                      </p:to>
-                                    </p:set>
-                                  </p:childTnLst>
-                                </p:cTn>
-                              </p:par>
-                              <p:par>
-                                <p:cTn id="21" presetID="1" presetClass="entr" presetSubtype="0" fill="hold" grpId="0" nodeType="withEffect">
-                                  <p:stCondLst>
-                                    <p:cond delay="0"/>
-                                  </p:stCondLst>
-                                  <p:childTnLst>
-                                    <p:set>
-                                      <p:cBhvr>
-                                        <p:cTn id="22" dur="1" fill="hold">
-                                          <p:stCondLst>
-                                            <p:cond delay="0"/>
-                                          </p:stCondLst>
-                                        </p:cTn>
-                                        <p:tgtEl>
-                                          <p:spTgt spid="24"/>
-                                        </p:tgtEl>
-                                        <p:attrNameLst>
-                                          <p:attrName>style.visibility</p:attrName>
-                                        </p:attrNameLst>
-                                      </p:cBhvr>
-                                      <p:to>
-                                        <p:strVal val="visible"/>
-                                      </p:to>
-                                    </p:set>
-                                  </p:childTnLst>
-                                </p:cTn>
-                              </p:par>
-                            </p:childTnLst>
-                          </p:cTn>
-                        </p:par>
-                      </p:childTnLst>
-                    </p:cTn>
-                  </p:par>
-                  <p:par>
-                    <p:cTn id="23" fill="hold">
-                      <p:stCondLst>
-                        <p:cond delay="indefinite"/>
-                      </p:stCondLst>
-                      <p:childTnLst>
-                        <p:par>
-                          <p:cTn id="24" fill="hold">
-                            <p:stCondLst>
-                              <p:cond delay="0"/>
-                            </p:stCondLst>
-                            <p:childTnLst>
-                              <p:par>
-                                <p:cTn id="25" presetID="1" presetClass="entr" presetSubtype="0" fill="hold" grpId="0" nodeType="clickEffect">
-                                  <p:stCondLst>
-                                    <p:cond delay="0"/>
-                                  </p:stCondLst>
-                                  <p:childTnLst>
-                                    <p:set>
-                                      <p:cBhvr>
-                                        <p:cTn id="26" dur="1" fill="hold">
-                                          <p:stCondLst>
-                                            <p:cond delay="0"/>
-                                          </p:stCondLst>
-                                        </p:cTn>
-                                        <p:tgtEl>
-                                          <p:spTgt spid="25"/>
-                                        </p:tgtEl>
-                                        <p:attrNameLst>
-                                          <p:attrName>style.visibility</p:attrName>
-                                        </p:attrNameLst>
-                                      </p:cBhvr>
-                                      <p:to>
-                                        <p:strVal val="visible"/>
-                                      </p:to>
-                                    </p:set>
-                                  </p:childTnLst>
-                                </p:cTn>
-                              </p:par>
-                            </p:childTnLst>
-                          </p:cTn>
-                        </p:par>
-                      </p:childTnLst>
-                    </p:cTn>
-                  </p:par>
-                  <p:par>
-                    <p:cTn id="27" fill="hold">
-                      <p:stCondLst>
-                        <p:cond delay="indefinite"/>
-                      </p:stCondLst>
-                      <p:childTnLst>
-                        <p:par>
-                          <p:cTn id="28" fill="hold">
-                            <p:stCondLst>
-                              <p:cond delay="0"/>
-                            </p:stCondLst>
-                            <p:childTnLst>
-                              <p:par>
-                                <p:cTn id="29" presetID="1" presetClass="entr" presetSubtype="0" fill="hold" grpId="0" nodeType="clickEffect">
-                                  <p:stCondLst>
-                                    <p:cond delay="0"/>
-                                  </p:stCondLst>
-                                  <p:childTnLst>
-                                    <p:set>
-                                      <p:cBhvr>
-                                        <p:cTn id="30" dur="1" fill="hold">
-                                          <p:stCondLst>
-                                            <p:cond delay="0"/>
-                                          </p:stCondLst>
-                                        </p:cTn>
-                                        <p:tgtEl>
-                                          <p:spTgt spid="26"/>
-                                        </p:tgtEl>
-                                        <p:attrNameLst>
-                                          <p:attrName>style.visibility</p:attrName>
-                                        </p:attrNameLst>
-                                      </p:cBhvr>
-                                      <p:to>
-                                        <p:strVal val="visible"/>
-                                      </p:to>
-                                    </p:set>
-                                  </p:childTnLst>
-                                </p:cTn>
-                              </p:par>
-                            </p:childTnLst>
-                          </p:cTn>
-                        </p:par>
-                      </p:childTnLst>
-                    </p:cTn>
-                  </p:par>
-                </p:childTnLst>
-              </p:cTn>
-              <p:prevCondLst>
-                <p:cond evt="onPrev" delay="0">
-                  <p:tgtEl>
-                    <p:sldTgt/>
-                  </p:tgtEl>
-                </p:cond>
-              </p:prevCondLst>
-              <p:nextCondLst>
-                <p:cond evt="onNext" delay="0">
-                  <p:tgtEl>
-                    <p:sldTgt/>
-                  </p:tgtEl>
-                </p:cond>
-              </p:nextCondLst>
-            </p:seq>
-          </p:childTnLst>
-        </p:cTn>
+        <p:cTn id="1" dur="indefinite" restart="never" nodeType="tmRoot"/>
       </p:par>
     </p:tnLst>
-    <p:bldLst>
-      <p:bldP spid="10" grpId="0"/>
-      <p:bldP spid="11" grpId="0"/>
-      <p:bldP spid="12" grpId="0" animBg="1"/>
-      <p:bldP spid="23" grpId="0"/>
-      <p:bldP spid="24" grpId="0"/>
-      <p:bldP spid="25" grpId="0" animBg="1"/>
-      <p:bldP spid="26" grpId="0" animBg="1"/>
-    </p:bldLst>
   </p:timing>
 </p:sld>
 </file>
@@ -10563,22 +11014,6 @@
               <a:rPr lang="en-GB" sz="2400" dirty="0" smtClean="0"/>
               <a:t>Error big enough?</a:t>
             </a:r>
-          </a:p>
-          <a:p>
-            <a:pPr>
-              <a:buFontTx/>
-              <a:buChar char="-"/>
-            </a:pPr>
-            <a:r>
-              <a:rPr lang="en-GB" sz="2400" dirty="0" smtClean="0"/>
-              <a:t>Right summary statistics used?</a:t>
-            </a:r>
-          </a:p>
-          <a:p>
-            <a:pPr>
-              <a:buNone/>
-            </a:pPr>
-            <a:endParaRPr lang="en-GB" sz="2400" dirty="0"/>
           </a:p>
         </p:txBody>
       </p:sp>
@@ -10786,9 +11221,38 @@
           <a:noFill/>
         </p:spPr>
       </p:pic>
+      <p:sp>
+        <p:nvSpPr>
+          <p:cNvPr id="2" name="Title 1"/>
+          <p:cNvSpPr>
+            <a:spLocks noGrp="1"/>
+          </p:cNvSpPr>
+          <p:nvPr>
+            <p:ph type="title"/>
+          </p:nvPr>
+        </p:nvSpPr>
+        <p:spPr/>
+        <p:txBody>
+          <a:bodyPr>
+            <a:normAutofit/>
+          </a:bodyPr>
+          <a:lstStyle/>
+          <a:p>
+            <a:r>
+              <a:rPr lang="en-GB" b="1" dirty="0" smtClean="0"/>
+              <a:t>Results: </a:t>
+            </a:r>
+            <a:r>
+              <a:rPr lang="en-GB" sz="3200" dirty="0" smtClean="0"/>
+              <a:t>Distribution gamma statistics</a:t>
+            </a:r>
+            <a:endParaRPr lang="en-GB" sz="4800" b="1" dirty="0"/>
+          </a:p>
+        </p:txBody>
+      </p:sp>
       <p:pic>
         <p:nvPicPr>
-          <p:cNvPr id="5122" name="Picture 2"/>
+          <p:cNvPr id="1026" name="Picture 2" descr="C:\Users\Aline\Dropbox\RUG 2015-2016\1.9 Community eclogy research\4. Poster_presentation\Figs and graphs ppt\Sampled Trees Gamma Statistics.png"/>
           <p:cNvPicPr>
             <a:picLocks noChangeAspect="1" noChangeArrowheads="1"/>
           </p:cNvPicPr>
@@ -10804,52 +11268,17 @@
         <p:spPr bwMode="auto">
           <a:xfrm>
             <a:off x="2057400" y="1143000"/>
-            <a:ext cx="5105400" cy="2833732"/>
+            <a:ext cx="5011737" cy="2781035"/>
           </a:xfrm>
           <a:prstGeom prst="rect">
             <a:avLst/>
           </a:prstGeom>
           <a:noFill/>
-          <a:ln w="9525">
-            <a:noFill/>
-            <a:miter lim="800000"/>
-            <a:headEnd/>
-            <a:tailEnd/>
-          </a:ln>
         </p:spPr>
       </p:pic>
-      <p:sp>
-        <p:nvSpPr>
-          <p:cNvPr id="2" name="Title 1"/>
-          <p:cNvSpPr>
-            <a:spLocks noGrp="1"/>
-          </p:cNvSpPr>
-          <p:nvPr>
-            <p:ph type="title"/>
-          </p:nvPr>
-        </p:nvSpPr>
-        <p:spPr/>
-        <p:txBody>
-          <a:bodyPr>
-            <a:normAutofit/>
-          </a:bodyPr>
-          <a:lstStyle/>
-          <a:p>
-            <a:r>
-              <a:rPr lang="en-GB" sz="4900" b="1" dirty="0" smtClean="0"/>
-              <a:t>Results: </a:t>
-            </a:r>
-            <a:r>
-              <a:rPr lang="en-GB" sz="3600" dirty="0" smtClean="0"/>
-              <a:t>Distribution gamma statistics</a:t>
-            </a:r>
-            <a:endParaRPr lang="en-GB" b="1" dirty="0"/>
-          </a:p>
-        </p:txBody>
-      </p:sp>
       <p:pic>
         <p:nvPicPr>
-          <p:cNvPr id="5123" name="Picture 3"/>
+          <p:cNvPr id="1027" name="Picture 3" descr="C:\Users\Aline\Dropbox\RUG 2015-2016\1.9 Community eclogy research\4. Poster_presentation\Figs and graphs ppt\Posterior Trees Gamma Statistics.png"/>
           <p:cNvPicPr>
             <a:picLocks noChangeAspect="1" noChangeArrowheads="1"/>
           </p:cNvPicPr>
@@ -10864,19 +11293,13 @@
         </p:blipFill>
         <p:spPr bwMode="auto">
           <a:xfrm>
-            <a:off x="1905000" y="3939680"/>
-            <a:ext cx="5257800" cy="2918320"/>
+            <a:off x="1905000" y="3962400"/>
+            <a:ext cx="5218193" cy="2895600"/>
           </a:xfrm>
           <a:prstGeom prst="rect">
             <a:avLst/>
           </a:prstGeom>
           <a:noFill/>
-          <a:ln w="9525">
-            <a:noFill/>
-            <a:miter lim="800000"/>
-            <a:headEnd/>
-            <a:tailEnd/>
-          </a:ln>
         </p:spPr>
       </p:pic>
     </p:spTree>

</xml_diff>